<commit_message>
Update template for all presentations. Add the template itself. Add a README file to start documenting processes and procedures.
</commit_message>
<xml_diff>
--- a/design.pptx
+++ b/design.pptx
@@ -1426,7 +1426,7 @@
         </p:blipFill>
         <p:spPr>
           <a:xfrm>
-            <a:off x="360640" y="483164"/>
+            <a:off x="360639" y="483164"/>
             <a:ext cx="2050840" cy="935496"/>
           </a:xfrm>
           <a:prstGeom prst="rect">
@@ -1513,45 +1513,10 @@
       </p:pic>
       <p:pic>
         <p:nvPicPr>
-          <p:cNvPr id="11" name="Picture 10">
+          <p:cNvPr id="8" name="Picture 7" descr="A picture containing shape&#10;&#10;Description automatically generated">
             <a:extLst>
               <a:ext uri="{FF2B5EF4-FFF2-40B4-BE49-F238E27FC236}">
-                <a16:creationId xmlns:a16="http://schemas.microsoft.com/office/drawing/2014/main" id="{FEB516F4-C09A-4E83-A0F1-168C638F25AA}"/>
-              </a:ext>
-            </a:extLst>
-          </p:cNvPr>
-          <p:cNvPicPr>
-            <a:picLocks noChangeAspect="1"/>
-          </p:cNvPicPr>
-          <p:nvPr userDrawn="1"/>
-        </p:nvPicPr>
-        <p:blipFill rotWithShape="1">
-          <a:blip r:embed="rId7">
-            <a:extLst>
-              <a:ext uri="{28A0092B-C50C-407E-A947-70E740481C1C}">
-                <a14:useLocalDpi xmlns:a14="http://schemas.microsoft.com/office/drawing/2010/main" val="0"/>
-              </a:ext>
-            </a:extLst>
-          </a:blip>
-          <a:srcRect r="58932" b="1495"/>
-          <a:stretch/>
-        </p:blipFill>
-        <p:spPr>
-          <a:xfrm rot="10800000">
-            <a:off x="-1" y="1572767"/>
-            <a:ext cx="2852965" cy="4078297"/>
-          </a:xfrm>
-          <a:prstGeom prst="rect">
-            <a:avLst/>
-          </a:prstGeom>
-        </p:spPr>
-      </p:pic>
-      <p:pic>
-        <p:nvPicPr>
-          <p:cNvPr id="10" name="Picture 9" descr="IDEAS_logo.png">
-            <a:extLst>
-              <a:ext uri="{FF2B5EF4-FFF2-40B4-BE49-F238E27FC236}">
-                <a16:creationId xmlns:a16="http://schemas.microsoft.com/office/drawing/2014/main" id="{9DE86E9C-D24A-4552-A542-495444B5B047}"/>
+                <a16:creationId xmlns:a16="http://schemas.microsoft.com/office/drawing/2014/main" id="{C432A180-7341-4E28-8C2B-73F9AB53D13F}"/>
               </a:ext>
             </a:extLst>
           </p:cNvPr>
@@ -1561,10 +1526,10 @@
           <p:nvPr userDrawn="1"/>
         </p:nvPicPr>
         <p:blipFill>
-          <a:blip r:embed="rId8" cstate="print">
+          <a:blip r:embed="rId7">
             <a:extLst>
               <a:ext uri="{28A0092B-C50C-407E-A947-70E740481C1C}">
-                <a14:useLocalDpi xmlns:a14="http://schemas.microsoft.com/office/drawing/2010/main"/>
+                <a14:useLocalDpi xmlns:a14="http://schemas.microsoft.com/office/drawing/2010/main" val="0"/>
               </a:ext>
             </a:extLst>
           </a:blip>
@@ -1574,8 +1539,8 @@
         </p:blipFill>
         <p:spPr>
           <a:xfrm>
-            <a:off x="211056" y="1848659"/>
-            <a:ext cx="2350008" cy="815135"/>
+            <a:off x="331810" y="1848659"/>
+            <a:ext cx="2108499" cy="914400"/>
           </a:xfrm>
           <a:prstGeom prst="rect">
             <a:avLst/>
@@ -1595,453 +1560,9 @@
 </p:sldLayout>
 </file>
 
-<file path=ppt/slideLayouts/slideLayout10.xml><?xml version="1.0" encoding="utf-8"?>
-<p:sldLayout xmlns:a="http://schemas.openxmlformats.org/drawingml/2006/main" xmlns:r="http://schemas.openxmlformats.org/officeDocument/2006/relationships" xmlns:p="http://schemas.openxmlformats.org/presentationml/2006/main" showMasterSp="0" userDrawn="1">
-  <p:cSld name="*Section Break">
-    <p:spTree>
-      <p:nvGrpSpPr>
-        <p:cNvPr id="1" name=""/>
-        <p:cNvGrpSpPr/>
-        <p:nvPr/>
-      </p:nvGrpSpPr>
-      <p:grpSpPr>
-        <a:xfrm>
-          <a:off x="0" y="0"/>
-          <a:ext cx="0" cy="0"/>
-          <a:chOff x="0" y="0"/>
-          <a:chExt cx="0" cy="0"/>
-        </a:xfrm>
-      </p:grpSpPr>
-      <p:pic>
-        <p:nvPicPr>
-          <p:cNvPr id="6" name="Picture 2" descr="C:\Users\amiesen\Desktop\anlrgbpptlogo.png"/>
-          <p:cNvPicPr>
-            <a:picLocks noChangeAspect="1" noChangeArrowheads="1"/>
-          </p:cNvPicPr>
-          <p:nvPr userDrawn="1"/>
-        </p:nvPicPr>
-        <p:blipFill>
-          <a:blip r:embed="rId2" cstate="print">
-            <a:extLst>
-              <a:ext uri="{28A0092B-C50C-407E-A947-70E740481C1C}">
-                <a14:useLocalDpi xmlns:a14="http://schemas.microsoft.com/office/drawing/2010/main" val="0"/>
-              </a:ext>
-            </a:extLst>
-          </a:blip>
-          <a:srcRect/>
-          <a:stretch>
-            <a:fillRect/>
-          </a:stretch>
-        </p:blipFill>
-        <p:spPr bwMode="auto">
-          <a:xfrm>
-            <a:off x="9865402" y="6156882"/>
-            <a:ext cx="2061700" cy="557186"/>
-          </a:xfrm>
-          <a:prstGeom prst="rect">
-            <a:avLst/>
-          </a:prstGeom>
-          <a:noFill/>
-          <a:extLst>
-            <a:ext uri="{909E8E84-426E-40dd-AFC4-6F175D3DCCD1}">
-              <a14:hiddenFill xmlns="" xmlns:a14="http://schemas.microsoft.com/office/drawing/2010/main">
-                <a:solidFill>
-                  <a:srgbClr val="FFFFFF"/>
-                </a:solidFill>
-              </a14:hiddenFill>
-            </a:ext>
-          </a:extLst>
-        </p:spPr>
-      </p:pic>
-      <p:pic>
-        <p:nvPicPr>
-          <p:cNvPr id="37" name="Picture 36" descr="aerial view of Argonne with APS in front 5730-00068.jpg"/>
-          <p:cNvPicPr>
-            <a:picLocks noChangeAspect="1"/>
-          </p:cNvPicPr>
-          <p:nvPr userDrawn="1"/>
-        </p:nvPicPr>
-        <p:blipFill rotWithShape="1">
-          <a:blip r:embed="rId3" cstate="email">
-            <a:extLst>
-              <a:ext uri="{28A0092B-C50C-407E-A947-70E740481C1C}">
-                <a14:useLocalDpi xmlns:a14="http://schemas.microsoft.com/office/drawing/2010/main" val="0"/>
-              </a:ext>
-            </a:extLst>
-          </a:blip>
-          <a:srcRect t="10682" b="7135"/>
-          <a:stretch/>
-        </p:blipFill>
-        <p:spPr>
-          <a:xfrm>
-            <a:off x="0" y="1"/>
-            <a:ext cx="12188825" cy="5984917"/>
-          </a:xfrm>
-          <a:prstGeom prst="rect">
-            <a:avLst/>
-          </a:prstGeom>
-        </p:spPr>
-      </p:pic>
-      <p:sp>
-        <p:nvSpPr>
-          <p:cNvPr id="3" name="Text Placeholder 2"/>
-          <p:cNvSpPr>
-            <a:spLocks noGrp="1"/>
-          </p:cNvSpPr>
-          <p:nvPr>
-            <p:ph type="body" sz="quarter" idx="10" hasCustomPrompt="1"/>
-          </p:nvPr>
-        </p:nvSpPr>
-        <p:spPr>
-          <a:xfrm>
-            <a:off x="2" y="-14246"/>
-            <a:ext cx="12188824" cy="5999163"/>
-          </a:xfrm>
-          <a:solidFill>
-            <a:schemeClr val="tx2">
-              <a:alpha val="90000"/>
-            </a:schemeClr>
-          </a:solidFill>
-        </p:spPr>
-        <p:txBody>
-          <a:bodyPr lIns="457200" tIns="0" bIns="457200" anchor="ctr"/>
-          <a:lstStyle>
-            <a:lvl1pPr marL="0" indent="0">
-              <a:buNone/>
-              <a:defRPr sz="2800" b="1" cap="all" baseline="0">
-                <a:solidFill>
-                  <a:schemeClr val="bg1"/>
-                </a:solidFill>
-              </a:defRPr>
-            </a:lvl1pPr>
-          </a:lstStyle>
-          <a:p>
-            <a:pPr lvl="0"/>
-            <a:r>
-              <a:rPr lang="en-US" dirty="0"/>
-              <a:t>Type in SECTION BREAK TITLE</a:t>
-            </a:r>
-          </a:p>
-        </p:txBody>
-      </p:sp>
-    </p:spTree>
-    <p:extLst>
-      <p:ext uri="{BB962C8B-B14F-4D97-AF65-F5344CB8AC3E}">
-        <p14:creationId xmlns:p14="http://schemas.microsoft.com/office/powerpoint/2010/main" val="4175080991"/>
-      </p:ext>
-    </p:extLst>
-  </p:cSld>
-  <p:clrMapOvr>
-    <a:masterClrMapping/>
-  </p:clrMapOvr>
-  <mc:AlternateContent xmlns:mc="http://schemas.openxmlformats.org/markup-compatibility/2006" xmlns:p14="http://schemas.microsoft.com/office/powerpoint/2010/main">
-    <mc:Choice Requires="p14">
-      <p:transition p14:dur="250">
-        <p:fade/>
-      </p:transition>
-    </mc:Choice>
-    <mc:Fallback xmlns="">
-      <p:transition>
-        <p:fade/>
-      </p:transition>
-    </mc:Fallback>
-  </mc:AlternateContent>
-</p:sldLayout>
-</file>
-
-<file path=ppt/slideLayouts/slideLayout11.xml><?xml version="1.0" encoding="utf-8"?>
-<p:sldLayout xmlns:a="http://schemas.openxmlformats.org/drawingml/2006/main" xmlns:r="http://schemas.openxmlformats.org/officeDocument/2006/relationships" xmlns:p="http://schemas.openxmlformats.org/presentationml/2006/main" showMasterSp="0" userDrawn="1">
-  <p:cSld name="*Closing slide">
-    <p:spTree>
-      <p:nvGrpSpPr>
-        <p:cNvPr id="1" name=""/>
-        <p:cNvGrpSpPr/>
-        <p:nvPr/>
-      </p:nvGrpSpPr>
-      <p:grpSpPr>
-        <a:xfrm>
-          <a:off x="0" y="0"/>
-          <a:ext cx="0" cy="0"/>
-          <a:chOff x="0" y="0"/>
-          <a:chExt cx="0" cy="0"/>
-        </a:xfrm>
-      </p:grpSpPr>
-      <p:pic>
-        <p:nvPicPr>
-          <p:cNvPr id="7" name="Picture 2" descr="C:\Users\amiesen\Desktop\anlrgbpptlogo.png"/>
-          <p:cNvPicPr>
-            <a:picLocks noChangeAspect="1" noChangeArrowheads="1"/>
-          </p:cNvPicPr>
-          <p:nvPr userDrawn="1"/>
-        </p:nvPicPr>
-        <p:blipFill>
-          <a:blip r:embed="rId2" cstate="print">
-            <a:extLst>
-              <a:ext uri="{28A0092B-C50C-407E-A947-70E740481C1C}">
-                <a14:useLocalDpi xmlns:a14="http://schemas.microsoft.com/office/drawing/2010/main" val="0"/>
-              </a:ext>
-            </a:extLst>
-          </a:blip>
-          <a:srcRect/>
-          <a:stretch>
-            <a:fillRect/>
-          </a:stretch>
-        </p:blipFill>
-        <p:spPr bwMode="auto">
-          <a:xfrm>
-            <a:off x="9865402" y="6156882"/>
-            <a:ext cx="2061700" cy="557186"/>
-          </a:xfrm>
-          <a:prstGeom prst="rect">
-            <a:avLst/>
-          </a:prstGeom>
-          <a:noFill/>
-          <a:extLst>
-            <a:ext uri="{909E8E84-426E-40dd-AFC4-6F175D3DCCD1}">
-              <a14:hiddenFill xmlns="" xmlns:a14="http://schemas.microsoft.com/office/drawing/2010/main">
-                <a:solidFill>
-                  <a:srgbClr val="FFFFFF"/>
-                </a:solidFill>
-              </a14:hiddenFill>
-            </a:ext>
-          </a:extLst>
-        </p:spPr>
-      </p:pic>
-      <p:sp>
-        <p:nvSpPr>
-          <p:cNvPr id="38" name="TextBox 37"/>
-          <p:cNvSpPr txBox="1"/>
-          <p:nvPr userDrawn="1"/>
-        </p:nvSpPr>
-        <p:spPr>
-          <a:xfrm>
-            <a:off x="626370" y="6247222"/>
-            <a:ext cx="1387624" cy="369332"/>
-          </a:xfrm>
-          <a:prstGeom prst="rect">
-            <a:avLst/>
-          </a:prstGeom>
-          <a:noFill/>
-        </p:spPr>
-        <p:txBody>
-          <a:bodyPr wrap="none" lIns="0" rtlCol="0">
-            <a:spAutoFit/>
-          </a:bodyPr>
-          <a:lstStyle/>
-          <a:p>
-            <a:r>
-              <a:rPr lang="en-US" dirty="0">
-                <a:solidFill>
-                  <a:schemeClr val="tx1">
-                    <a:lumMod val="50000"/>
-                  </a:schemeClr>
-                </a:solidFill>
-              </a:rPr>
-              <a:t>www.anl.gov</a:t>
-            </a:r>
-          </a:p>
-        </p:txBody>
-      </p:sp>
-      <p:pic>
-        <p:nvPicPr>
-          <p:cNvPr id="8" name="Picture 7" descr="aerial view of Argonne with APS in front 5730-00068.jpg"/>
-          <p:cNvPicPr>
-            <a:picLocks noChangeAspect="1"/>
-          </p:cNvPicPr>
-          <p:nvPr userDrawn="1"/>
-        </p:nvPicPr>
-        <p:blipFill rotWithShape="1">
-          <a:blip r:embed="rId3" cstate="email">
-            <a:extLst>
-              <a:ext uri="{28A0092B-C50C-407E-A947-70E740481C1C}">
-                <a14:useLocalDpi xmlns:a14="http://schemas.microsoft.com/office/drawing/2010/main" val="0"/>
-              </a:ext>
-            </a:extLst>
-          </a:blip>
-          <a:srcRect t="10682" b="7135"/>
-          <a:stretch/>
-        </p:blipFill>
-        <p:spPr>
-          <a:xfrm>
-            <a:off x="0" y="1"/>
-            <a:ext cx="12188825" cy="5984917"/>
-          </a:xfrm>
-          <a:prstGeom prst="rect">
-            <a:avLst/>
-          </a:prstGeom>
-        </p:spPr>
-      </p:pic>
-      <p:sp>
-        <p:nvSpPr>
-          <p:cNvPr id="9" name="Text Placeholder 2"/>
-          <p:cNvSpPr>
-            <a:spLocks noGrp="1"/>
-          </p:cNvSpPr>
-          <p:nvPr>
-            <p:ph type="body" sz="quarter" idx="10" hasCustomPrompt="1"/>
-          </p:nvPr>
-        </p:nvSpPr>
-        <p:spPr>
-          <a:xfrm>
-            <a:off x="1" y="-14246"/>
-            <a:ext cx="12188824" cy="5999163"/>
-          </a:xfrm>
-          <a:solidFill>
-            <a:schemeClr val="tx2">
-              <a:alpha val="90000"/>
-            </a:schemeClr>
-          </a:solidFill>
-        </p:spPr>
-        <p:txBody>
-          <a:bodyPr lIns="457200" tIns="0" bIns="457200" anchor="ctr"/>
-          <a:lstStyle>
-            <a:lvl1pPr marL="0" indent="0">
-              <a:buNone/>
-              <a:defRPr sz="2800" b="1" cap="all" baseline="0">
-                <a:solidFill>
-                  <a:schemeClr val="bg1"/>
-                </a:solidFill>
-              </a:defRPr>
-            </a:lvl1pPr>
-          </a:lstStyle>
-          <a:p>
-            <a:pPr lvl="0"/>
-            <a:r>
-              <a:rPr lang="en-US" dirty="0"/>
-              <a:t>Type in closing statement</a:t>
-            </a:r>
-          </a:p>
-        </p:txBody>
-      </p:sp>
-      <p:sp>
-        <p:nvSpPr>
-          <p:cNvPr id="6" name="TextBox 5"/>
-          <p:cNvSpPr txBox="1"/>
-          <p:nvPr userDrawn="1"/>
-        </p:nvSpPr>
-        <p:spPr>
-          <a:xfrm>
-            <a:off x="-1320994" y="-1815882"/>
-            <a:ext cx="5041353" cy="1600438"/>
-          </a:xfrm>
-          <a:prstGeom prst="rect">
-            <a:avLst/>
-          </a:prstGeom>
-          <a:solidFill>
-            <a:schemeClr val="bg1">
-              <a:lumMod val="50000"/>
-            </a:schemeClr>
-          </a:solidFill>
-        </p:spPr>
-        <p:txBody>
-          <a:bodyPr wrap="square" rtlCol="0">
-            <a:spAutoFit/>
-          </a:bodyPr>
-          <a:lstStyle/>
-          <a:p>
-            <a:r>
-              <a:rPr lang="en-US" sz="1400" b="1" dirty="0">
-                <a:solidFill>
-                  <a:schemeClr val="bg1"/>
-                </a:solidFill>
-              </a:rPr>
-              <a:t>Suggested</a:t>
-            </a:r>
-            <a:r>
-              <a:rPr lang="en-US" sz="1400" b="1" baseline="0" dirty="0">
-                <a:solidFill>
-                  <a:schemeClr val="bg1"/>
-                </a:solidFill>
-              </a:rPr>
-              <a:t> closing statement (optional): </a:t>
-            </a:r>
-          </a:p>
-          <a:p>
-            <a:endParaRPr lang="en-US" sz="1400" b="1" baseline="0" dirty="0">
-              <a:solidFill>
-                <a:schemeClr val="bg1"/>
-              </a:solidFill>
-            </a:endParaRPr>
-          </a:p>
-          <a:p>
-            <a:pPr lvl="0"/>
-            <a:r>
-              <a:rPr lang="en-US" sz="1400" b="1" dirty="0">
-                <a:solidFill>
-                  <a:schemeClr val="bg1"/>
-                </a:solidFill>
-              </a:rPr>
-              <a:t>WE START WITH YES.</a:t>
-            </a:r>
-          </a:p>
-          <a:p>
-            <a:pPr lvl="0">
-              <a:spcAft>
-                <a:spcPts val="1200"/>
-              </a:spcAft>
-            </a:pPr>
-            <a:r>
-              <a:rPr lang="en-US" sz="1400" b="1" dirty="0">
-                <a:solidFill>
-                  <a:schemeClr val="bg1"/>
-                </a:solidFill>
-              </a:rPr>
-              <a:t>AND END WITH THANK YOU.</a:t>
-            </a:r>
-          </a:p>
-          <a:p>
-            <a:pPr lvl="0"/>
-            <a:r>
-              <a:rPr lang="en-US" sz="1400" b="1" dirty="0">
-                <a:solidFill>
-                  <a:schemeClr val="bg1"/>
-                </a:solidFill>
-              </a:rPr>
-              <a:t>DO YOU HAVE ANY BIG QUESTIONS?</a:t>
-            </a:r>
-            <a:endParaRPr lang="en-US" sz="1400" dirty="0">
-              <a:solidFill>
-                <a:schemeClr val="bg1"/>
-              </a:solidFill>
-            </a:endParaRPr>
-          </a:p>
-          <a:p>
-            <a:endParaRPr lang="en-US" dirty="0">
-              <a:solidFill>
-                <a:schemeClr val="bg1"/>
-              </a:solidFill>
-            </a:endParaRPr>
-          </a:p>
-        </p:txBody>
-      </p:sp>
-    </p:spTree>
-    <p:extLst>
-      <p:ext uri="{BB962C8B-B14F-4D97-AF65-F5344CB8AC3E}">
-        <p14:creationId xmlns:p14="http://schemas.microsoft.com/office/powerpoint/2010/main" val="3957595170"/>
-      </p:ext>
-    </p:extLst>
-  </p:cSld>
-  <p:clrMapOvr>
-    <a:masterClrMapping/>
-  </p:clrMapOvr>
-  <mc:AlternateContent xmlns:mc="http://schemas.openxmlformats.org/markup-compatibility/2006" xmlns:p14="http://schemas.microsoft.com/office/powerpoint/2010/main">
-    <mc:Choice Requires="p14">
-      <p:transition p14:dur="250">
-        <p:fade/>
-      </p:transition>
-    </mc:Choice>
-    <mc:Fallback xmlns="">
-      <p:transition>
-        <p:fade/>
-      </p:transition>
-    </mc:Fallback>
-  </mc:AlternateContent>
-</p:sldLayout>
-</file>
-
-<file path=ppt/slideLayouts/slideLayout12.xml><?xml version="1.0" encoding="utf-8"?>
-<p:sldLayout xmlns:a="http://schemas.openxmlformats.org/drawingml/2006/main" xmlns:r="http://schemas.openxmlformats.org/officeDocument/2006/relationships" xmlns:p="http://schemas.openxmlformats.org/presentationml/2006/main" type="title">
-  <p:cSld name="1_Title Slide">
+<file path=ppt/slideLayouts/slideLayout2.xml><?xml version="1.0" encoding="utf-8"?>
+<p:sldLayout xmlns:a="http://schemas.openxmlformats.org/drawingml/2006/main" xmlns:r="http://schemas.openxmlformats.org/officeDocument/2006/relationships" xmlns:p="http://schemas.openxmlformats.org/presentationml/2006/main" showMasterSp="0" preserve="1" userDrawn="1">
+  <p:cSld name="8_Title Slide">
     <p:spTree>
       <p:nvGrpSpPr>
         <p:cNvPr id="1" name=""/>
@@ -2058,28 +1579,184 @@
       </p:grpSpPr>
       <p:sp>
         <p:nvSpPr>
+          <p:cNvPr id="4" name="Rectangle 3">
+            <a:extLst>
+              <a:ext uri="{FF2B5EF4-FFF2-40B4-BE49-F238E27FC236}">
+                <a16:creationId xmlns:a16="http://schemas.microsoft.com/office/drawing/2014/main" id="{2E2177C6-060C-4445-8C10-ADA6D3CE5F74}"/>
+              </a:ext>
+            </a:extLst>
+          </p:cNvPr>
+          <p:cNvSpPr/>
+          <p:nvPr userDrawn="1"/>
+        </p:nvSpPr>
+        <p:spPr>
+          <a:xfrm>
+            <a:off x="0" y="6186396"/>
+            <a:ext cx="12188825" cy="671604"/>
+          </a:xfrm>
+          <a:prstGeom prst="rect">
+            <a:avLst/>
+          </a:prstGeom>
+          <a:solidFill>
+            <a:schemeClr val="accent1">
+              <a:lumMod val="75000"/>
+            </a:schemeClr>
+          </a:solidFill>
+          <a:ln>
+            <a:noFill/>
+          </a:ln>
+          <a:effectLst/>
+          <a:scene3d>
+            <a:camera prst="orthographicFront">
+              <a:rot lat="0" lon="0" rev="0"/>
+            </a:camera>
+            <a:lightRig rig="threePt" dir="t">
+              <a:rot lat="0" lon="0" rev="1200000"/>
+            </a:lightRig>
+          </a:scene3d>
+          <a:sp3d/>
+        </p:spPr>
+        <p:style>
+          <a:lnRef idx="0">
+            <a:schemeClr val="accent1"/>
+          </a:lnRef>
+          <a:fillRef idx="3">
+            <a:schemeClr val="accent1"/>
+          </a:fillRef>
+          <a:effectRef idx="3">
+            <a:schemeClr val="accent1"/>
+          </a:effectRef>
+          <a:fontRef idx="minor">
+            <a:schemeClr val="lt1"/>
+          </a:fontRef>
+        </p:style>
+        <p:txBody>
+          <a:bodyPr rot="0" spcFirstLastPara="0" vertOverflow="overflow" horzOverflow="overflow" vert="horz" wrap="square" lIns="548640" tIns="45720" rIns="45720" bIns="45720" numCol="1" spcCol="0" rtlCol="0" fromWordArt="0" anchor="ctr" anchorCtr="0" forceAA="0" compatLnSpc="1">
+            <a:prstTxWarp prst="textNoShape">
+              <a:avLst/>
+            </a:prstTxWarp>
+            <a:noAutofit/>
+          </a:bodyPr>
+          <a:lstStyle/>
+          <a:p>
+            <a:pPr algn="l">
+              <a:lnSpc>
+                <a:spcPct val="90000"/>
+              </a:lnSpc>
+            </a:pPr>
+            <a:r>
+              <a:rPr lang="en-US" sz="1600" dirty="0">
+                <a:ln>
+                  <a:noFill/>
+                </a:ln>
+                <a:solidFill>
+                  <a:schemeClr val="bg1"/>
+                </a:solidFill>
+              </a:rPr>
+              <a:t>exascaleproject.org</a:t>
+            </a:r>
+          </a:p>
+        </p:txBody>
+      </p:sp>
+      <p:sp>
+        <p:nvSpPr>
+          <p:cNvPr id="22" name="Rectangle 21"/>
+          <p:cNvSpPr/>
+          <p:nvPr userDrawn="1"/>
+        </p:nvSpPr>
+        <p:spPr>
+          <a:xfrm>
+            <a:off x="8305800" y="5921829"/>
+            <a:ext cx="3883025" cy="936171"/>
+          </a:xfrm>
+          <a:prstGeom prst="rect">
+            <a:avLst/>
+          </a:prstGeom>
+          <a:noFill/>
+          <a:ln>
+            <a:noFill/>
+          </a:ln>
+          <a:effectLst/>
+          <a:scene3d>
+            <a:camera prst="orthographicFront">
+              <a:rot lat="0" lon="0" rev="0"/>
+            </a:camera>
+            <a:lightRig rig="threePt" dir="t">
+              <a:rot lat="0" lon="0" rev="1200000"/>
+            </a:lightRig>
+          </a:scene3d>
+          <a:sp3d/>
+        </p:spPr>
+        <p:style>
+          <a:lnRef idx="0">
+            <a:schemeClr val="accent1"/>
+          </a:lnRef>
+          <a:fillRef idx="3">
+            <a:schemeClr val="accent1"/>
+          </a:fillRef>
+          <a:effectRef idx="3">
+            <a:schemeClr val="accent1"/>
+          </a:effectRef>
+          <a:fontRef idx="minor">
+            <a:schemeClr val="lt1"/>
+          </a:fontRef>
+        </p:style>
+        <p:txBody>
+          <a:bodyPr rot="0" spcFirstLastPara="0" vertOverflow="overflow" horzOverflow="overflow" vert="horz" wrap="square" lIns="45720" tIns="45720" rIns="45720" bIns="45720" numCol="1" spcCol="0" rtlCol="0" fromWordArt="0" anchor="ctr" anchorCtr="0" forceAA="0" compatLnSpc="1">
+            <a:prstTxWarp prst="textNoShape">
+              <a:avLst/>
+            </a:prstTxWarp>
+            <a:noAutofit/>
+          </a:bodyPr>
+          <a:lstStyle/>
+          <a:p>
+            <a:pPr algn="ctr">
+              <a:lnSpc>
+                <a:spcPct val="90000"/>
+              </a:lnSpc>
+            </a:pPr>
+            <a:endParaRPr lang="en-US" dirty="0">
+              <a:solidFill>
+                <a:schemeClr val="tx1"/>
+              </a:solidFill>
+            </a:endParaRPr>
+          </a:p>
+        </p:txBody>
+      </p:sp>
+      <p:sp>
+        <p:nvSpPr>
           <p:cNvPr id="2" name="Title 1"/>
           <p:cNvSpPr>
             <a:spLocks noGrp="1"/>
           </p:cNvSpPr>
-          <p:nvPr>
+          <p:nvPr userDrawn="1">
             <p:ph type="ctrTitle"/>
           </p:nvPr>
         </p:nvSpPr>
         <p:spPr>
           <a:xfrm>
-            <a:off x="914162" y="2130428"/>
-            <a:ext cx="10360501" cy="1470025"/>
+            <a:off x="3177633" y="503144"/>
+            <a:ext cx="8292316" cy="1030930"/>
           </a:xfrm>
         </p:spPr>
         <p:txBody>
-          <a:bodyPr/>
-          <a:lstStyle/>
+          <a:bodyPr anchor="b"/>
+          <a:lstStyle>
+            <a:lvl1pPr algn="l">
+              <a:defRPr sz="3200" b="1">
+                <a:solidFill>
+                  <a:schemeClr val="tx1"/>
+                </a:solidFill>
+                <a:latin typeface="+mn-lt"/>
+              </a:defRPr>
+            </a:lvl1pPr>
+          </a:lstStyle>
           <a:p>
             <a:r>
               <a:rPr lang="en-US"/>
               <a:t>Click to edit Master title style</a:t>
             </a:r>
+            <a:endParaRPr lang="en-US" dirty="0"/>
           </a:p>
         </p:txBody>
       </p:sp>
@@ -2089,20 +1766,30 @@
           <p:cNvSpPr>
             <a:spLocks noGrp="1"/>
           </p:cNvSpPr>
-          <p:nvPr>
+          <p:nvPr userDrawn="1">
             <p:ph type="subTitle" idx="1"/>
           </p:nvPr>
         </p:nvSpPr>
         <p:spPr>
           <a:xfrm>
-            <a:off x="1828324" y="3886200"/>
-            <a:ext cx="8532178" cy="1752600"/>
+            <a:off x="3177632" y="2085962"/>
+            <a:ext cx="8292317" cy="2855300"/>
           </a:xfrm>
         </p:spPr>
         <p:txBody>
-          <a:bodyPr/>
+          <a:bodyPr lIns="109728"/>
           <a:lstStyle>
-            <a:lvl1pPr marL="0" indent="0" algn="ctr">
+            <a:lvl1pPr marL="0" indent="0" algn="l">
+              <a:buNone/>
+              <a:defRPr sz="2400">
+                <a:solidFill>
+                  <a:schemeClr val="tx1"/>
+                </a:solidFill>
+                <a:latin typeface="Arial" panose="020B0604020202020204" pitchFamily="34" charset="0"/>
+                <a:cs typeface="Arial" panose="020B0604020202020204" pitchFamily="34" charset="0"/>
+              </a:defRPr>
+            </a:lvl1pPr>
+            <a:lvl2pPr marL="457200" indent="0" algn="ctr">
               <a:buNone/>
               <a:defRPr>
                 <a:solidFill>
@@ -2111,8 +1798,8 @@
                   </a:schemeClr>
                 </a:solidFill>
               </a:defRPr>
-            </a:lvl1pPr>
-            <a:lvl2pPr marL="342900" indent="0" algn="ctr">
+            </a:lvl2pPr>
+            <a:lvl3pPr marL="914400" indent="0" algn="ctr">
               <a:buNone/>
               <a:defRPr>
                 <a:solidFill>
@@ -2121,8 +1808,8 @@
                   </a:schemeClr>
                 </a:solidFill>
               </a:defRPr>
-            </a:lvl2pPr>
-            <a:lvl3pPr marL="685800" indent="0" algn="ctr">
+            </a:lvl3pPr>
+            <a:lvl4pPr marL="1371600" indent="0" algn="ctr">
               <a:buNone/>
               <a:defRPr>
                 <a:solidFill>
@@ -2131,8 +1818,8 @@
                   </a:schemeClr>
                 </a:solidFill>
               </a:defRPr>
-            </a:lvl3pPr>
-            <a:lvl4pPr marL="1028700" indent="0" algn="ctr">
+            </a:lvl4pPr>
+            <a:lvl5pPr marL="1828800" indent="0" algn="ctr">
               <a:buNone/>
               <a:defRPr>
                 <a:solidFill>
@@ -2141,8 +1828,8 @@
                   </a:schemeClr>
                 </a:solidFill>
               </a:defRPr>
-            </a:lvl4pPr>
-            <a:lvl5pPr marL="1371600" indent="0" algn="ctr">
+            </a:lvl5pPr>
+            <a:lvl6pPr marL="2286000" indent="0" algn="ctr">
               <a:buNone/>
               <a:defRPr>
                 <a:solidFill>
@@ -2151,8 +1838,8 @@
                   </a:schemeClr>
                 </a:solidFill>
               </a:defRPr>
-            </a:lvl5pPr>
-            <a:lvl6pPr marL="1714500" indent="0" algn="ctr">
+            </a:lvl6pPr>
+            <a:lvl7pPr marL="2743200" indent="0" algn="ctr">
               <a:buNone/>
               <a:defRPr>
                 <a:solidFill>
@@ -2161,8 +1848,8 @@
                   </a:schemeClr>
                 </a:solidFill>
               </a:defRPr>
-            </a:lvl6pPr>
-            <a:lvl7pPr marL="2057400" indent="0" algn="ctr">
+            </a:lvl7pPr>
+            <a:lvl8pPr marL="3200400" indent="0" algn="ctr">
               <a:buNone/>
               <a:defRPr>
                 <a:solidFill>
@@ -2171,8 +1858,8 @@
                   </a:schemeClr>
                 </a:solidFill>
               </a:defRPr>
-            </a:lvl7pPr>
-            <a:lvl8pPr marL="2400300" indent="0" algn="ctr">
+            </a:lvl8pPr>
+            <a:lvl9pPr marL="3657600" indent="0" algn="ctr">
               <a:buNone/>
               <a:defRPr>
                 <a:solidFill>
@@ -2181,16 +1868,6 @@
                   </a:schemeClr>
                 </a:solidFill>
               </a:defRPr>
-            </a:lvl8pPr>
-            <a:lvl9pPr marL="2743200" indent="0" algn="ctr">
-              <a:buNone/>
-              <a:defRPr>
-                <a:solidFill>
-                  <a:schemeClr val="tx1">
-                    <a:tint val="75000"/>
-                  </a:schemeClr>
-                </a:solidFill>
-              </a:defRPr>
             </a:lvl9pPr>
           </a:lstStyle>
           <a:p>
@@ -2198,78 +1875,280 @@
               <a:rPr lang="en-US"/>
               <a:t>Click to edit Master subtitle style</a:t>
             </a:r>
+            <a:endParaRPr lang="en-US" dirty="0"/>
           </a:p>
         </p:txBody>
       </p:sp>
+      <p:pic>
+        <p:nvPicPr>
+          <p:cNvPr id="12" name="Picture 11"/>
+          <p:cNvPicPr>
+            <a:picLocks noChangeAspect="1"/>
+          </p:cNvPicPr>
+          <p:nvPr userDrawn="1"/>
+        </p:nvPicPr>
+        <p:blipFill>
+          <a:blip r:embed="rId2" cstate="print">
+            <a:extLst>
+              <a:ext uri="{28A0092B-C50C-407E-A947-70E740481C1C}">
+                <a14:useLocalDpi xmlns:a14="http://schemas.microsoft.com/office/drawing/2010/main" val="0"/>
+              </a:ext>
+            </a:extLst>
+          </a:blip>
+          <a:stretch>
+            <a:fillRect/>
+          </a:stretch>
+        </p:blipFill>
+        <p:spPr>
+          <a:xfrm>
+            <a:off x="362749" y="483164"/>
+            <a:ext cx="2050840" cy="935496"/>
+          </a:xfrm>
+          <a:prstGeom prst="rect">
+            <a:avLst/>
+          </a:prstGeom>
+        </p:spPr>
+      </p:pic>
+      <p:pic>
+        <p:nvPicPr>
+          <p:cNvPr id="16" name="Picture 15"/>
+          <p:cNvPicPr>
+            <a:picLocks noChangeAspect="1"/>
+          </p:cNvPicPr>
+          <p:nvPr userDrawn="1"/>
+        </p:nvPicPr>
+        <p:blipFill>
+          <a:blip r:embed="rId3" cstate="print">
+            <a:extLst>
+              <a:ext uri="{BEBA8EAE-BF5A-486C-A8C5-ECC9F3942E4B}">
+                <a14:imgProps xmlns:a14="http://schemas.microsoft.com/office/drawing/2010/main">
+                  <a14:imgLayer r:embed="rId4">
+                    <a14:imgEffect>
+                      <a14:brightnessContrast bright="100000"/>
+                    </a14:imgEffect>
+                  </a14:imgLayer>
+                </a14:imgProps>
+              </a:ext>
+              <a:ext uri="{28A0092B-C50C-407E-A947-70E740481C1C}">
+                <a14:useLocalDpi xmlns:a14="http://schemas.microsoft.com/office/drawing/2010/main" val="0"/>
+              </a:ext>
+            </a:extLst>
+          </a:blip>
+          <a:stretch>
+            <a:fillRect/>
+          </a:stretch>
+        </p:blipFill>
+        <p:spPr>
+          <a:xfrm>
+            <a:off x="7289921" y="6322747"/>
+            <a:ext cx="2409477" cy="401008"/>
+          </a:xfrm>
+          <a:prstGeom prst="rect">
+            <a:avLst/>
+          </a:prstGeom>
+        </p:spPr>
+      </p:pic>
+      <p:pic>
+        <p:nvPicPr>
+          <p:cNvPr id="17" name="Picture 16"/>
+          <p:cNvPicPr>
+            <a:picLocks noChangeAspect="1"/>
+          </p:cNvPicPr>
+          <p:nvPr userDrawn="1"/>
+        </p:nvPicPr>
+        <p:blipFill rotWithShape="1">
+          <a:blip r:embed="rId5" cstate="print">
+            <a:extLst>
+              <a:ext uri="{BEBA8EAE-BF5A-486C-A8C5-ECC9F3942E4B}">
+                <a14:imgProps xmlns:a14="http://schemas.microsoft.com/office/drawing/2010/main">
+                  <a14:imgLayer r:embed="rId6">
+                    <a14:imgEffect>
+                      <a14:brightnessContrast bright="100000"/>
+                    </a14:imgEffect>
+                  </a14:imgLayer>
+                </a14:imgProps>
+              </a:ext>
+              <a:ext uri="{28A0092B-C50C-407E-A947-70E740481C1C}">
+                <a14:useLocalDpi xmlns:a14="http://schemas.microsoft.com/office/drawing/2010/main" val="0"/>
+              </a:ext>
+            </a:extLst>
+          </a:blip>
+          <a:srcRect b="70693"/>
+          <a:stretch/>
+        </p:blipFill>
+        <p:spPr>
+          <a:xfrm>
+            <a:off x="10204521" y="6307740"/>
+            <a:ext cx="1367541" cy="428915"/>
+          </a:xfrm>
+          <a:prstGeom prst="rect">
+            <a:avLst/>
+          </a:prstGeom>
+        </p:spPr>
+      </p:pic>
+      <p:pic>
+        <p:nvPicPr>
+          <p:cNvPr id="8" name="Picture 7" descr="A picture containing shape&#10;&#10;Description automatically generated">
+            <a:extLst>
+              <a:ext uri="{FF2B5EF4-FFF2-40B4-BE49-F238E27FC236}">
+                <a16:creationId xmlns:a16="http://schemas.microsoft.com/office/drawing/2014/main" id="{C432A180-7341-4E28-8C2B-73F9AB53D13F}"/>
+              </a:ext>
+            </a:extLst>
+          </p:cNvPr>
+          <p:cNvPicPr>
+            <a:picLocks noChangeAspect="1"/>
+          </p:cNvPicPr>
+          <p:nvPr userDrawn="1"/>
+        </p:nvPicPr>
+        <p:blipFill>
+          <a:blip r:embed="rId7">
+            <a:extLst>
+              <a:ext uri="{28A0092B-C50C-407E-A947-70E740481C1C}">
+                <a14:useLocalDpi xmlns:a14="http://schemas.microsoft.com/office/drawing/2010/main" val="0"/>
+              </a:ext>
+            </a:extLst>
+          </a:blip>
+          <a:stretch>
+            <a:fillRect/>
+          </a:stretch>
+        </p:blipFill>
+        <p:spPr>
+          <a:xfrm>
+            <a:off x="333920" y="1848659"/>
+            <a:ext cx="2108499" cy="914400"/>
+          </a:xfrm>
+          <a:prstGeom prst="rect">
+            <a:avLst/>
+          </a:prstGeom>
+        </p:spPr>
+      </p:pic>
+      <p:pic>
+        <p:nvPicPr>
+          <p:cNvPr id="13" name="Picture 2" descr="https://licensebuttons.net/l/by/4.0/88x31.png">
+            <a:extLst>
+              <a:ext uri="{FF2B5EF4-FFF2-40B4-BE49-F238E27FC236}">
+                <a16:creationId xmlns:a16="http://schemas.microsoft.com/office/drawing/2014/main" id="{FAFD7D99-41CA-4FD0-9396-9C5659F22045}"/>
+              </a:ext>
+            </a:extLst>
+          </p:cNvPr>
+          <p:cNvPicPr>
+            <a:picLocks noChangeAspect="1" noChangeArrowheads="1"/>
+          </p:cNvPicPr>
+          <p:nvPr userDrawn="1"/>
+        </p:nvPicPr>
+        <p:blipFill>
+          <a:blip r:embed="rId8">
+            <a:extLst>
+              <a:ext uri="{28A0092B-C50C-407E-A947-70E740481C1C}">
+                <a14:useLocalDpi xmlns:a14="http://schemas.microsoft.com/office/drawing/2010/main" val="0"/>
+              </a:ext>
+            </a:extLst>
+          </a:blip>
+          <a:srcRect/>
+          <a:stretch>
+            <a:fillRect/>
+          </a:stretch>
+        </p:blipFill>
+        <p:spPr bwMode="auto">
+          <a:xfrm>
+            <a:off x="969069" y="5841262"/>
+            <a:ext cx="838200" cy="295275"/>
+          </a:xfrm>
+          <a:prstGeom prst="rect">
+            <a:avLst/>
+          </a:prstGeom>
+          <a:noFill/>
+          <a:extLst>
+            <a:ext uri="{909E8E84-426E-40DD-AFC4-6F175D3DCCD1}">
+              <a14:hiddenFill xmlns:a14="http://schemas.microsoft.com/office/drawing/2010/main">
+                <a:solidFill>
+                  <a:srgbClr val="FFFFFF"/>
+                </a:solidFill>
+              </a14:hiddenFill>
+            </a:ext>
+          </a:extLst>
+        </p:spPr>
+      </p:pic>
       <p:sp>
         <p:nvSpPr>
-          <p:cNvPr id="4" name="Date Placeholder 3"/>
-          <p:cNvSpPr>
-            <a:spLocks noGrp="1"/>
-          </p:cNvSpPr>
-          <p:nvPr>
-            <p:ph type="dt" sz="half" idx="10"/>
-          </p:nvPr>
+          <p:cNvPr id="14" name="TextBox 13">
+            <a:extLst>
+              <a:ext uri="{FF2B5EF4-FFF2-40B4-BE49-F238E27FC236}">
+                <a16:creationId xmlns:a16="http://schemas.microsoft.com/office/drawing/2014/main" id="{9D022D1C-99FF-490C-8690-D8081D33C0AF}"/>
+              </a:ext>
+            </a:extLst>
+          </p:cNvPr>
+          <p:cNvSpPr txBox="1"/>
+          <p:nvPr userDrawn="1"/>
         </p:nvSpPr>
-        <p:spPr/>
+        <p:spPr>
+          <a:xfrm>
+            <a:off x="1810964" y="5776533"/>
+            <a:ext cx="1171114" cy="424732"/>
+          </a:xfrm>
+          <a:prstGeom prst="rect">
+            <a:avLst/>
+          </a:prstGeom>
+          <a:noFill/>
+        </p:spPr>
         <p:txBody>
-          <a:bodyPr/>
+          <a:bodyPr wrap="square" rtlCol="0">
+            <a:spAutoFit/>
+          </a:bodyPr>
           <a:lstStyle/>
           <a:p>
-            <a:fld id="{68F49DD1-DDB5-AB43-B311-7649AD474C82}" type="datetimeFigureOut">
-              <a:rPr lang="en-US" smtClean="0"/>
-              <a:t>5/21/2021</a:t>
-            </a:fld>
-            <a:endParaRPr lang="en-US"/>
+            <a:pPr algn="ctr">
+              <a:lnSpc>
+                <a:spcPct val="90000"/>
+              </a:lnSpc>
+            </a:pPr>
+            <a:r>
+              <a:rPr lang="en-US" sz="1200" dirty="0"/>
+              <a:t>See slide 2 for license details</a:t>
+            </a:r>
           </a:p>
         </p:txBody>
       </p:sp>
-      <p:sp>
-        <p:nvSpPr>
-          <p:cNvPr id="5" name="Footer Placeholder 4"/>
-          <p:cNvSpPr>
-            <a:spLocks noGrp="1"/>
-          </p:cNvSpPr>
-          <p:nvPr>
-            <p:ph type="ftr" sz="quarter" idx="11"/>
-          </p:nvPr>
-        </p:nvSpPr>
-        <p:spPr/>
-        <p:txBody>
-          <a:bodyPr/>
-          <a:lstStyle/>
-          <a:p>
-            <a:endParaRPr lang="en-US"/>
-          </a:p>
-        </p:txBody>
-      </p:sp>
-      <p:sp>
-        <p:nvSpPr>
-          <p:cNvPr id="6" name="Slide Number Placeholder 5"/>
-          <p:cNvSpPr>
-            <a:spLocks noGrp="1"/>
-          </p:cNvSpPr>
-          <p:nvPr>
-            <p:ph type="sldNum" sz="quarter" idx="12"/>
-          </p:nvPr>
-        </p:nvSpPr>
-        <p:spPr/>
-        <p:txBody>
-          <a:bodyPr/>
-          <a:lstStyle/>
-          <a:p>
-            <a:fld id="{AEB3D163-D76A-5F4F-A4CE-5FA8F639A976}" type="slidenum">
-              <a:rPr lang="en-US" smtClean="0"/>
-              <a:t>‹#›</a:t>
-            </a:fld>
-            <a:endParaRPr lang="en-US"/>
-          </a:p>
-        </p:txBody>
-      </p:sp>
+      <p:pic>
+        <p:nvPicPr>
+          <p:cNvPr id="15" name="Picture 14">
+            <a:extLst>
+              <a:ext uri="{FF2B5EF4-FFF2-40B4-BE49-F238E27FC236}">
+                <a16:creationId xmlns:a16="http://schemas.microsoft.com/office/drawing/2014/main" id="{C554CDC7-44CF-4751-9869-0265C8E01840}"/>
+              </a:ext>
+            </a:extLst>
+          </p:cNvPr>
+          <p:cNvPicPr>
+            <a:picLocks noChangeAspect="1"/>
+          </p:cNvPicPr>
+          <p:nvPr userDrawn="1"/>
+        </p:nvPicPr>
+        <p:blipFill>
+          <a:blip r:embed="rId9" cstate="print">
+            <a:extLst>
+              <a:ext uri="{28A0092B-C50C-407E-A947-70E740481C1C}">
+                <a14:useLocalDpi xmlns:a14="http://schemas.microsoft.com/office/drawing/2010/main" val="0"/>
+              </a:ext>
+            </a:extLst>
+          </a:blip>
+          <a:stretch>
+            <a:fillRect/>
+          </a:stretch>
+        </p:blipFill>
+        <p:spPr>
+          <a:xfrm>
+            <a:off x="333211" y="3189686"/>
+            <a:ext cx="2109916" cy="905256"/>
+          </a:xfrm>
+          <a:prstGeom prst="rect">
+            <a:avLst/>
+          </a:prstGeom>
+        </p:spPr>
+      </p:pic>
     </p:spTree>
     <p:extLst>
       <p:ext uri="{BB962C8B-B14F-4D97-AF65-F5344CB8AC3E}">
-        <p14:creationId xmlns:p14="http://schemas.microsoft.com/office/powerpoint/2010/main" val="3159426199"/>
+        <p14:creationId xmlns:p14="http://schemas.microsoft.com/office/powerpoint/2010/main" val="451228200"/>
       </p:ext>
     </p:extLst>
   </p:cSld>
@@ -2279,7 +2158,7 @@
 </p:sldLayout>
 </file>
 
-<file path=ppt/slideLayouts/slideLayout2.xml><?xml version="1.0" encoding="utf-8"?>
+<file path=ppt/slideLayouts/slideLayout3.xml><?xml version="1.0" encoding="utf-8"?>
 <p:sldLayout xmlns:a="http://schemas.openxmlformats.org/drawingml/2006/main" xmlns:r="http://schemas.openxmlformats.org/officeDocument/2006/relationships" xmlns:p="http://schemas.openxmlformats.org/presentationml/2006/main" type="obj" preserve="1">
   <p:cSld name="Title and Content">
     <p:bg>
@@ -2434,7 +2313,7 @@
 </p:sldLayout>
 </file>
 
-<file path=ppt/slideLayouts/slideLayout3.xml><?xml version="1.0" encoding="utf-8"?>
+<file path=ppt/slideLayouts/slideLayout4.xml><?xml version="1.0" encoding="utf-8"?>
 <p:sldLayout xmlns:a="http://schemas.openxmlformats.org/drawingml/2006/main" xmlns:r="http://schemas.openxmlformats.org/officeDocument/2006/relationships" xmlns:p="http://schemas.openxmlformats.org/presentationml/2006/main" type="twoTxTwoObj" preserve="1">
   <p:cSld name="Comparison">
     <p:spTree>
@@ -2905,7 +2784,7 @@
 </p:sldLayout>
 </file>
 
-<file path=ppt/slideLayouts/slideLayout4.xml><?xml version="1.0" encoding="utf-8"?>
+<file path=ppt/slideLayouts/slideLayout5.xml><?xml version="1.0" encoding="utf-8"?>
 <p:sldLayout xmlns:a="http://schemas.openxmlformats.org/drawingml/2006/main" xmlns:r="http://schemas.openxmlformats.org/officeDocument/2006/relationships" xmlns:p="http://schemas.openxmlformats.org/presentationml/2006/main" preserve="1" userDrawn="1">
   <p:cSld name="quad chart">
     <p:spTree>
@@ -3668,7 +3547,7 @@
 </p:sldLayout>
 </file>
 
-<file path=ppt/slideLayouts/slideLayout5.xml><?xml version="1.0" encoding="utf-8"?>
+<file path=ppt/slideLayouts/slideLayout6.xml><?xml version="1.0" encoding="utf-8"?>
 <p:sldLayout xmlns:a="http://schemas.openxmlformats.org/drawingml/2006/main" xmlns:r="http://schemas.openxmlformats.org/officeDocument/2006/relationships" xmlns:p="http://schemas.openxmlformats.org/presentationml/2006/main" preserve="1" userDrawn="1">
   <p:cSld name="Section divider">
     <p:spTree>
@@ -3726,7 +3605,7 @@
 </p:sldLayout>
 </file>
 
-<file path=ppt/slideLayouts/slideLayout6.xml><?xml version="1.0" encoding="utf-8"?>
+<file path=ppt/slideLayouts/slideLayout7.xml><?xml version="1.0" encoding="utf-8"?>
 <p:sldLayout xmlns:a="http://schemas.openxmlformats.org/drawingml/2006/main" xmlns:r="http://schemas.openxmlformats.org/officeDocument/2006/relationships" xmlns:p="http://schemas.openxmlformats.org/presentationml/2006/main" type="titleOnly" preserve="1">
   <p:cSld name="Title Only">
     <p:spTree>
@@ -3784,472 +3663,9 @@
 </p:sldLayout>
 </file>
 
-<file path=ppt/slideLayouts/slideLayout7.xml><?xml version="1.0" encoding="utf-8"?>
-<p:sldLayout xmlns:a="http://schemas.openxmlformats.org/drawingml/2006/main" xmlns:r="http://schemas.openxmlformats.org/officeDocument/2006/relationships" xmlns:p="http://schemas.openxmlformats.org/presentationml/2006/main" showMasterSp="0" userDrawn="1">
-  <p:cSld name="Section break">
-    <p:spTree>
-      <p:nvGrpSpPr>
-        <p:cNvPr id="1" name=""/>
-        <p:cNvGrpSpPr/>
-        <p:nvPr/>
-      </p:nvGrpSpPr>
-      <p:grpSpPr>
-        <a:xfrm>
-          <a:off x="0" y="0"/>
-          <a:ext cx="0" cy="0"/>
-          <a:chOff x="0" y="0"/>
-          <a:chExt cx="0" cy="0"/>
-        </a:xfrm>
-      </p:grpSpPr>
-      <p:sp>
-        <p:nvSpPr>
-          <p:cNvPr id="22" name="Rectangle 21"/>
-          <p:cNvSpPr/>
-          <p:nvPr userDrawn="1"/>
-        </p:nvSpPr>
-        <p:spPr>
-          <a:xfrm>
-            <a:off x="8305800" y="5921829"/>
-            <a:ext cx="3883025" cy="936171"/>
-          </a:xfrm>
-          <a:prstGeom prst="rect">
-            <a:avLst/>
-          </a:prstGeom>
-          <a:noFill/>
-          <a:ln>
-            <a:noFill/>
-          </a:ln>
-          <a:effectLst/>
-          <a:scene3d>
-            <a:camera prst="orthographicFront">
-              <a:rot lat="0" lon="0" rev="0"/>
-            </a:camera>
-            <a:lightRig rig="threePt" dir="t">
-              <a:rot lat="0" lon="0" rev="1200000"/>
-            </a:lightRig>
-          </a:scene3d>
-          <a:sp3d/>
-        </p:spPr>
-        <p:style>
-          <a:lnRef idx="0">
-            <a:schemeClr val="accent1"/>
-          </a:lnRef>
-          <a:fillRef idx="3">
-            <a:schemeClr val="accent1"/>
-          </a:fillRef>
-          <a:effectRef idx="3">
-            <a:schemeClr val="accent1"/>
-          </a:effectRef>
-          <a:fontRef idx="minor">
-            <a:schemeClr val="lt1"/>
-          </a:fontRef>
-        </p:style>
-        <p:txBody>
-          <a:bodyPr rot="0" spcFirstLastPara="0" vertOverflow="overflow" horzOverflow="overflow" vert="horz" wrap="square" lIns="45720" tIns="45720" rIns="45720" bIns="45720" numCol="1" spcCol="0" rtlCol="0" fromWordArt="0" anchor="ctr" anchorCtr="0" forceAA="0" compatLnSpc="1">
-            <a:prstTxWarp prst="textNoShape">
-              <a:avLst/>
-            </a:prstTxWarp>
-            <a:noAutofit/>
-          </a:bodyPr>
-          <a:lstStyle/>
-          <a:p>
-            <a:pPr algn="ctr">
-              <a:lnSpc>
-                <a:spcPct val="90000"/>
-              </a:lnSpc>
-            </a:pPr>
-            <a:endParaRPr lang="en-US" dirty="0">
-              <a:solidFill>
-                <a:schemeClr val="tx1"/>
-              </a:solidFill>
-            </a:endParaRPr>
-          </a:p>
-        </p:txBody>
-      </p:sp>
-      <p:sp>
-        <p:nvSpPr>
-          <p:cNvPr id="2" name="Title 1"/>
-          <p:cNvSpPr>
-            <a:spLocks noGrp="1"/>
-          </p:cNvSpPr>
-          <p:nvPr userDrawn="1">
-            <p:ph type="ctrTitle"/>
-          </p:nvPr>
-        </p:nvSpPr>
-        <p:spPr>
-          <a:xfrm>
-            <a:off x="365760" y="411480"/>
-            <a:ext cx="6962455" cy="510909"/>
-          </a:xfrm>
-        </p:spPr>
-        <p:txBody>
-          <a:bodyPr/>
-          <a:lstStyle>
-            <a:lvl1pPr algn="l">
-              <a:defRPr sz="3200" b="1">
-                <a:solidFill>
-                  <a:schemeClr val="tx1"/>
-                </a:solidFill>
-                <a:latin typeface="+mn-lt"/>
-              </a:defRPr>
-            </a:lvl1pPr>
-          </a:lstStyle>
-          <a:p>
-            <a:r>
-              <a:rPr lang="en-US" dirty="0"/>
-              <a:t>Click to edit Master title style</a:t>
-            </a:r>
-          </a:p>
-        </p:txBody>
-      </p:sp>
-      <p:pic>
-        <p:nvPicPr>
-          <p:cNvPr id="12" name="Picture 11"/>
-          <p:cNvPicPr>
-            <a:picLocks noChangeAspect="1"/>
-          </p:cNvPicPr>
-          <p:nvPr userDrawn="1"/>
-        </p:nvPicPr>
-        <p:blipFill>
-          <a:blip r:embed="rId2" cstate="print">
-            <a:extLst>
-              <a:ext uri="{28A0092B-C50C-407E-A947-70E740481C1C}">
-                <a14:useLocalDpi xmlns:a14="http://schemas.microsoft.com/office/drawing/2010/main" val="0"/>
-              </a:ext>
-            </a:extLst>
-          </a:blip>
-          <a:stretch>
-            <a:fillRect/>
-          </a:stretch>
-        </p:blipFill>
-        <p:spPr>
-          <a:xfrm>
-            <a:off x="8256801" y="4458940"/>
-            <a:ext cx="3047137" cy="1389960"/>
-          </a:xfrm>
-          <a:prstGeom prst="rect">
-            <a:avLst/>
-          </a:prstGeom>
-        </p:spPr>
-      </p:pic>
-      <p:grpSp>
-        <p:nvGrpSpPr>
-          <p:cNvPr id="13" name="Group 12"/>
-          <p:cNvGrpSpPr/>
-          <p:nvPr userDrawn="1"/>
-        </p:nvGrpSpPr>
-        <p:grpSpPr>
-          <a:xfrm>
-            <a:off x="-4595" y="6002316"/>
-            <a:ext cx="12198096" cy="27432"/>
-            <a:chOff x="-9675" y="6830568"/>
-            <a:chExt cx="9176303" cy="27432"/>
-          </a:xfrm>
-        </p:grpSpPr>
-        <p:sp>
-          <p:nvSpPr>
-            <p:cNvPr id="14" name="Rectangle 13"/>
-            <p:cNvSpPr/>
-            <p:nvPr userDrawn="1"/>
-          </p:nvSpPr>
-          <p:spPr>
-            <a:xfrm>
-              <a:off x="5529226" y="6830568"/>
-              <a:ext cx="3637402" cy="27432"/>
-            </a:xfrm>
-            <a:prstGeom prst="rect">
-              <a:avLst/>
-            </a:prstGeom>
-            <a:solidFill>
-              <a:schemeClr val="accent4"/>
-            </a:solidFill>
-            <a:ln>
-              <a:noFill/>
-            </a:ln>
-            <a:effectLst/>
-            <a:scene3d>
-              <a:camera prst="orthographicFront">
-                <a:rot lat="0" lon="0" rev="0"/>
-              </a:camera>
-              <a:lightRig rig="threePt" dir="t">
-                <a:rot lat="0" lon="0" rev="1200000"/>
-              </a:lightRig>
-            </a:scene3d>
-            <a:sp3d/>
-          </p:spPr>
-          <p:style>
-            <a:lnRef idx="0">
-              <a:schemeClr val="accent1"/>
-            </a:lnRef>
-            <a:fillRef idx="3">
-              <a:schemeClr val="accent1"/>
-            </a:fillRef>
-            <a:effectRef idx="3">
-              <a:schemeClr val="accent1"/>
-            </a:effectRef>
-            <a:fontRef idx="minor">
-              <a:schemeClr val="lt1"/>
-            </a:fontRef>
-          </p:style>
-          <p:txBody>
-            <a:bodyPr rot="0" spcFirstLastPara="0" vertOverflow="overflow" horzOverflow="overflow" vert="horz" wrap="square" lIns="45720" tIns="45720" rIns="45720" bIns="45720" numCol="1" spcCol="0" rtlCol="0" fromWordArt="0" anchor="ctr" anchorCtr="0" forceAA="0" compatLnSpc="1">
-              <a:prstTxWarp prst="textNoShape">
-                <a:avLst/>
-              </a:prstTxWarp>
-              <a:noAutofit/>
-            </a:bodyPr>
-            <a:lstStyle/>
-            <a:p>
-              <a:pPr algn="ctr">
-                <a:lnSpc>
-                  <a:spcPct val="90000"/>
-                </a:lnSpc>
-              </a:pPr>
-              <a:endParaRPr lang="en-US" dirty="0">
-                <a:solidFill>
-                  <a:schemeClr val="tx1"/>
-                </a:solidFill>
-              </a:endParaRPr>
-            </a:p>
-          </p:txBody>
-        </p:sp>
-        <p:sp>
-          <p:nvSpPr>
-            <p:cNvPr id="15" name="Rectangle 14"/>
-            <p:cNvSpPr/>
-            <p:nvPr userDrawn="1"/>
-          </p:nvSpPr>
-          <p:spPr>
-            <a:xfrm>
-              <a:off x="-9675" y="6830568"/>
-              <a:ext cx="5542707" cy="27432"/>
-            </a:xfrm>
-            <a:prstGeom prst="rect">
-              <a:avLst/>
-            </a:prstGeom>
-            <a:solidFill>
-              <a:schemeClr val="accent3">
-                <a:lumMod val="75000"/>
-              </a:schemeClr>
-            </a:solidFill>
-            <a:ln>
-              <a:noFill/>
-            </a:ln>
-            <a:effectLst/>
-            <a:scene3d>
-              <a:camera prst="orthographicFront">
-                <a:rot lat="0" lon="0" rev="0"/>
-              </a:camera>
-              <a:lightRig rig="threePt" dir="t">
-                <a:rot lat="0" lon="0" rev="1200000"/>
-              </a:lightRig>
-            </a:scene3d>
-            <a:sp3d/>
-          </p:spPr>
-          <p:style>
-            <a:lnRef idx="0">
-              <a:schemeClr val="accent1"/>
-            </a:lnRef>
-            <a:fillRef idx="3">
-              <a:schemeClr val="accent1"/>
-            </a:fillRef>
-            <a:effectRef idx="3">
-              <a:schemeClr val="accent1"/>
-            </a:effectRef>
-            <a:fontRef idx="minor">
-              <a:schemeClr val="lt1"/>
-            </a:fontRef>
-          </p:style>
-          <p:txBody>
-            <a:bodyPr rot="0" spcFirstLastPara="0" vertOverflow="overflow" horzOverflow="overflow" vert="horz" wrap="square" lIns="45720" tIns="45720" rIns="45720" bIns="45720" numCol="1" spcCol="0" rtlCol="0" fromWordArt="0" anchor="ctr" anchorCtr="0" forceAA="0" compatLnSpc="1">
-              <a:prstTxWarp prst="textNoShape">
-                <a:avLst/>
-              </a:prstTxWarp>
-              <a:noAutofit/>
-            </a:bodyPr>
-            <a:lstStyle/>
-            <a:p>
-              <a:pPr lvl="0" algn="ctr">
-                <a:lnSpc>
-                  <a:spcPct val="90000"/>
-                </a:lnSpc>
-              </a:pPr>
-              <a:endParaRPr lang="en-US" dirty="0">
-                <a:solidFill>
-                  <a:schemeClr val="tx1"/>
-                </a:solidFill>
-              </a:endParaRPr>
-            </a:p>
-          </p:txBody>
-        </p:sp>
-      </p:grpSp>
-      <p:grpSp>
-        <p:nvGrpSpPr>
-          <p:cNvPr id="11" name="Group 10"/>
-          <p:cNvGrpSpPr/>
-          <p:nvPr userDrawn="1"/>
-        </p:nvGrpSpPr>
-        <p:grpSpPr>
-          <a:xfrm>
-            <a:off x="-4595" y="4272576"/>
-            <a:ext cx="12198096" cy="27432"/>
-            <a:chOff x="-9675" y="6830568"/>
-            <a:chExt cx="9176303" cy="27432"/>
-          </a:xfrm>
-        </p:grpSpPr>
-        <p:sp>
-          <p:nvSpPr>
-            <p:cNvPr id="18" name="Rectangle 17"/>
-            <p:cNvSpPr/>
-            <p:nvPr userDrawn="1"/>
-          </p:nvSpPr>
-          <p:spPr>
-            <a:xfrm>
-              <a:off x="5529226" y="6830568"/>
-              <a:ext cx="3637402" cy="27432"/>
-            </a:xfrm>
-            <a:prstGeom prst="rect">
-              <a:avLst/>
-            </a:prstGeom>
-            <a:solidFill>
-              <a:schemeClr val="accent4"/>
-            </a:solidFill>
-            <a:ln>
-              <a:noFill/>
-            </a:ln>
-            <a:effectLst/>
-            <a:scene3d>
-              <a:camera prst="orthographicFront">
-                <a:rot lat="0" lon="0" rev="0"/>
-              </a:camera>
-              <a:lightRig rig="threePt" dir="t">
-                <a:rot lat="0" lon="0" rev="1200000"/>
-              </a:lightRig>
-            </a:scene3d>
-            <a:sp3d/>
-          </p:spPr>
-          <p:style>
-            <a:lnRef idx="0">
-              <a:schemeClr val="accent1"/>
-            </a:lnRef>
-            <a:fillRef idx="3">
-              <a:schemeClr val="accent1"/>
-            </a:fillRef>
-            <a:effectRef idx="3">
-              <a:schemeClr val="accent1"/>
-            </a:effectRef>
-            <a:fontRef idx="minor">
-              <a:schemeClr val="lt1"/>
-            </a:fontRef>
-          </p:style>
-          <p:txBody>
-            <a:bodyPr rot="0" spcFirstLastPara="0" vertOverflow="overflow" horzOverflow="overflow" vert="horz" wrap="square" lIns="45720" tIns="45720" rIns="45720" bIns="45720" numCol="1" spcCol="0" rtlCol="0" fromWordArt="0" anchor="ctr" anchorCtr="0" forceAA="0" compatLnSpc="1">
-              <a:prstTxWarp prst="textNoShape">
-                <a:avLst/>
-              </a:prstTxWarp>
-              <a:noAutofit/>
-            </a:bodyPr>
-            <a:lstStyle/>
-            <a:p>
-              <a:pPr algn="ctr">
-                <a:lnSpc>
-                  <a:spcPct val="90000"/>
-                </a:lnSpc>
-              </a:pPr>
-              <a:endParaRPr lang="en-US" dirty="0">
-                <a:solidFill>
-                  <a:schemeClr val="tx1"/>
-                </a:solidFill>
-              </a:endParaRPr>
-            </a:p>
-          </p:txBody>
-        </p:sp>
-        <p:sp>
-          <p:nvSpPr>
-            <p:cNvPr id="19" name="Rectangle 18"/>
-            <p:cNvSpPr/>
-            <p:nvPr userDrawn="1"/>
-          </p:nvSpPr>
-          <p:spPr>
-            <a:xfrm>
-              <a:off x="-9675" y="6830568"/>
-              <a:ext cx="5542707" cy="27432"/>
-            </a:xfrm>
-            <a:prstGeom prst="rect">
-              <a:avLst/>
-            </a:prstGeom>
-            <a:solidFill>
-              <a:schemeClr val="accent3">
-                <a:lumMod val="75000"/>
-              </a:schemeClr>
-            </a:solidFill>
-            <a:ln>
-              <a:noFill/>
-            </a:ln>
-            <a:effectLst/>
-            <a:scene3d>
-              <a:camera prst="orthographicFront">
-                <a:rot lat="0" lon="0" rev="0"/>
-              </a:camera>
-              <a:lightRig rig="threePt" dir="t">
-                <a:rot lat="0" lon="0" rev="1200000"/>
-              </a:lightRig>
-            </a:scene3d>
-            <a:sp3d/>
-          </p:spPr>
-          <p:style>
-            <a:lnRef idx="0">
-              <a:schemeClr val="accent1"/>
-            </a:lnRef>
-            <a:fillRef idx="3">
-              <a:schemeClr val="accent1"/>
-            </a:fillRef>
-            <a:effectRef idx="3">
-              <a:schemeClr val="accent1"/>
-            </a:effectRef>
-            <a:fontRef idx="minor">
-              <a:schemeClr val="lt1"/>
-            </a:fontRef>
-          </p:style>
-          <p:txBody>
-            <a:bodyPr rot="0" spcFirstLastPara="0" vertOverflow="overflow" horzOverflow="overflow" vert="horz" wrap="square" lIns="45720" tIns="45720" rIns="45720" bIns="45720" numCol="1" spcCol="0" rtlCol="0" fromWordArt="0" anchor="ctr" anchorCtr="0" forceAA="0" compatLnSpc="1">
-              <a:prstTxWarp prst="textNoShape">
-                <a:avLst/>
-              </a:prstTxWarp>
-              <a:noAutofit/>
-            </a:bodyPr>
-            <a:lstStyle/>
-            <a:p>
-              <a:pPr lvl="0" algn="ctr">
-                <a:lnSpc>
-                  <a:spcPct val="90000"/>
-                </a:lnSpc>
-              </a:pPr>
-              <a:endParaRPr lang="en-US" dirty="0">
-                <a:solidFill>
-                  <a:schemeClr val="tx1"/>
-                </a:solidFill>
-              </a:endParaRPr>
-            </a:p>
-          </p:txBody>
-        </p:sp>
-      </p:grpSp>
-    </p:spTree>
-    <p:extLst>
-      <p:ext uri="{BB962C8B-B14F-4D97-AF65-F5344CB8AC3E}">
-        <p14:creationId xmlns:p14="http://schemas.microsoft.com/office/powerpoint/2010/main" val="116598578"/>
-      </p:ext>
-    </p:extLst>
-  </p:cSld>
-  <p:clrMapOvr>
-    <a:masterClrMapping/>
-  </p:clrMapOvr>
-</p:sldLayout>
-</file>
-
 <file path=ppt/slideLayouts/slideLayout8.xml><?xml version="1.0" encoding="utf-8"?>
-<p:sldLayout xmlns:a="http://schemas.openxmlformats.org/drawingml/2006/main" xmlns:r="http://schemas.openxmlformats.org/officeDocument/2006/relationships" xmlns:p="http://schemas.openxmlformats.org/presentationml/2006/main" type="objAndTx">
-  <p:cSld name="Title, Content and Text">
+<p:sldLayout xmlns:a="http://schemas.openxmlformats.org/drawingml/2006/main" xmlns:r="http://schemas.openxmlformats.org/officeDocument/2006/relationships" xmlns:p="http://schemas.openxmlformats.org/presentationml/2006/main" type="title">
+  <p:cSld name="1_Title Slide">
     <p:spTree>
       <p:nvGrpSpPr>
         <p:cNvPr id="1" name=""/>
@@ -4271,13 +3687,13 @@
             <a:spLocks noGrp="1"/>
           </p:cNvSpPr>
           <p:nvPr>
-            <p:ph type="title"/>
+            <p:ph type="ctrTitle"/>
           </p:nvPr>
         </p:nvSpPr>
         <p:spPr>
           <a:xfrm>
-            <a:off x="1523603" y="228600"/>
-            <a:ext cx="9243192" cy="381000"/>
+            <a:off x="914162" y="2130428"/>
+            <a:ext cx="10360501" cy="1470025"/>
           </a:xfrm>
         </p:spPr>
         <p:txBody>
@@ -4293,120 +3709,191 @@
       </p:sp>
       <p:sp>
         <p:nvSpPr>
-          <p:cNvPr id="3" name="Content Placeholder 2"/>
+          <p:cNvPr id="3" name="Subtitle 2"/>
           <p:cNvSpPr>
             <a:spLocks noGrp="1"/>
           </p:cNvSpPr>
           <p:nvPr>
-            <p:ph sz="half" idx="1"/>
+            <p:ph type="subTitle" idx="1"/>
           </p:nvPr>
         </p:nvSpPr>
         <p:spPr>
           <a:xfrm>
-            <a:off x="914162" y="1295400"/>
-            <a:ext cx="5180251" cy="4800600"/>
+            <a:off x="1828324" y="3886200"/>
+            <a:ext cx="8532178" cy="1752600"/>
           </a:xfrm>
         </p:spPr>
         <p:txBody>
           <a:bodyPr/>
-          <a:lstStyle/>
-          <a:p>
-            <a:pPr lvl="0"/>
+          <a:lstStyle>
+            <a:lvl1pPr marL="0" indent="0" algn="ctr">
+              <a:buNone/>
+              <a:defRPr>
+                <a:solidFill>
+                  <a:schemeClr val="tx1">
+                    <a:tint val="75000"/>
+                  </a:schemeClr>
+                </a:solidFill>
+              </a:defRPr>
+            </a:lvl1pPr>
+            <a:lvl2pPr marL="342900" indent="0" algn="ctr">
+              <a:buNone/>
+              <a:defRPr>
+                <a:solidFill>
+                  <a:schemeClr val="tx1">
+                    <a:tint val="75000"/>
+                  </a:schemeClr>
+                </a:solidFill>
+              </a:defRPr>
+            </a:lvl2pPr>
+            <a:lvl3pPr marL="685800" indent="0" algn="ctr">
+              <a:buNone/>
+              <a:defRPr>
+                <a:solidFill>
+                  <a:schemeClr val="tx1">
+                    <a:tint val="75000"/>
+                  </a:schemeClr>
+                </a:solidFill>
+              </a:defRPr>
+            </a:lvl3pPr>
+            <a:lvl4pPr marL="1028700" indent="0" algn="ctr">
+              <a:buNone/>
+              <a:defRPr>
+                <a:solidFill>
+                  <a:schemeClr val="tx1">
+                    <a:tint val="75000"/>
+                  </a:schemeClr>
+                </a:solidFill>
+              </a:defRPr>
+            </a:lvl4pPr>
+            <a:lvl5pPr marL="1371600" indent="0" algn="ctr">
+              <a:buNone/>
+              <a:defRPr>
+                <a:solidFill>
+                  <a:schemeClr val="tx1">
+                    <a:tint val="75000"/>
+                  </a:schemeClr>
+                </a:solidFill>
+              </a:defRPr>
+            </a:lvl5pPr>
+            <a:lvl6pPr marL="1714500" indent="0" algn="ctr">
+              <a:buNone/>
+              <a:defRPr>
+                <a:solidFill>
+                  <a:schemeClr val="tx1">
+                    <a:tint val="75000"/>
+                  </a:schemeClr>
+                </a:solidFill>
+              </a:defRPr>
+            </a:lvl6pPr>
+            <a:lvl7pPr marL="2057400" indent="0" algn="ctr">
+              <a:buNone/>
+              <a:defRPr>
+                <a:solidFill>
+                  <a:schemeClr val="tx1">
+                    <a:tint val="75000"/>
+                  </a:schemeClr>
+                </a:solidFill>
+              </a:defRPr>
+            </a:lvl7pPr>
+            <a:lvl8pPr marL="2400300" indent="0" algn="ctr">
+              <a:buNone/>
+              <a:defRPr>
+                <a:solidFill>
+                  <a:schemeClr val="tx1">
+                    <a:tint val="75000"/>
+                  </a:schemeClr>
+                </a:solidFill>
+              </a:defRPr>
+            </a:lvl8pPr>
+            <a:lvl9pPr marL="2743200" indent="0" algn="ctr">
+              <a:buNone/>
+              <a:defRPr>
+                <a:solidFill>
+                  <a:schemeClr val="tx1">
+                    <a:tint val="75000"/>
+                  </a:schemeClr>
+                </a:solidFill>
+              </a:defRPr>
+            </a:lvl9pPr>
+          </a:lstStyle>
+          <a:p>
             <a:r>
               <a:rPr lang="en-US"/>
-              <a:t>Click to edit Master text styles</a:t>
-            </a:r>
-          </a:p>
-          <a:p>
-            <a:pPr lvl="1"/>
-            <a:r>
-              <a:rPr lang="en-US"/>
-              <a:t>Second level</a:t>
-            </a:r>
-          </a:p>
-          <a:p>
-            <a:pPr lvl="2"/>
-            <a:r>
-              <a:rPr lang="en-US"/>
-              <a:t>Third level</a:t>
-            </a:r>
-          </a:p>
-          <a:p>
-            <a:pPr lvl="3"/>
-            <a:r>
-              <a:rPr lang="en-US"/>
-              <a:t>Fourth level</a:t>
-            </a:r>
-          </a:p>
-          <a:p>
-            <a:pPr lvl="4"/>
-            <a:r>
-              <a:rPr lang="en-US"/>
-              <a:t>Fifth level</a:t>
+              <a:t>Click to edit Master subtitle style</a:t>
             </a:r>
           </a:p>
         </p:txBody>
       </p:sp>
       <p:sp>
         <p:nvSpPr>
-          <p:cNvPr id="4" name="Text Placeholder 3"/>
+          <p:cNvPr id="4" name="Date Placeholder 3"/>
           <p:cNvSpPr>
             <a:spLocks noGrp="1"/>
           </p:cNvSpPr>
           <p:nvPr>
-            <p:ph type="body" sz="half" idx="2"/>
+            <p:ph type="dt" sz="half" idx="10"/>
           </p:nvPr>
         </p:nvSpPr>
-        <p:spPr>
-          <a:xfrm>
-            <a:off x="6297559" y="1295400"/>
-            <a:ext cx="5180251" cy="4800600"/>
-          </a:xfrm>
-        </p:spPr>
+        <p:spPr/>
         <p:txBody>
           <a:bodyPr/>
           <a:lstStyle/>
           <a:p>
-            <a:pPr lvl="0"/>
-            <a:r>
-              <a:rPr lang="en-US"/>
-              <a:t>Click to edit Master text styles</a:t>
-            </a:r>
-          </a:p>
-          <a:p>
-            <a:pPr lvl="1"/>
-            <a:r>
-              <a:rPr lang="en-US"/>
-              <a:t>Second level</a:t>
-            </a:r>
-          </a:p>
-          <a:p>
-            <a:pPr lvl="2"/>
-            <a:r>
-              <a:rPr lang="en-US"/>
-              <a:t>Third level</a:t>
-            </a:r>
-          </a:p>
-          <a:p>
-            <a:pPr lvl="3"/>
-            <a:r>
-              <a:rPr lang="en-US"/>
-              <a:t>Fourth level</a:t>
-            </a:r>
-          </a:p>
-          <a:p>
-            <a:pPr lvl="4"/>
-            <a:r>
-              <a:rPr lang="en-US"/>
-              <a:t>Fifth level</a:t>
-            </a:r>
+            <a:fld id="{68F49DD1-DDB5-AB43-B311-7649AD474C82}" type="datetimeFigureOut">
+              <a:rPr lang="en-US" smtClean="0"/>
+              <a:t>5/21/2021</a:t>
+            </a:fld>
+            <a:endParaRPr lang="en-US"/>
+          </a:p>
+        </p:txBody>
+      </p:sp>
+      <p:sp>
+        <p:nvSpPr>
+          <p:cNvPr id="5" name="Footer Placeholder 4"/>
+          <p:cNvSpPr>
+            <a:spLocks noGrp="1"/>
+          </p:cNvSpPr>
+          <p:nvPr>
+            <p:ph type="ftr" sz="quarter" idx="11"/>
+          </p:nvPr>
+        </p:nvSpPr>
+        <p:spPr/>
+        <p:txBody>
+          <a:bodyPr/>
+          <a:lstStyle/>
+          <a:p>
+            <a:endParaRPr lang="en-US"/>
+          </a:p>
+        </p:txBody>
+      </p:sp>
+      <p:sp>
+        <p:nvSpPr>
+          <p:cNvPr id="6" name="Slide Number Placeholder 5"/>
+          <p:cNvSpPr>
+            <a:spLocks noGrp="1"/>
+          </p:cNvSpPr>
+          <p:nvPr>
+            <p:ph type="sldNum" sz="quarter" idx="12"/>
+          </p:nvPr>
+        </p:nvSpPr>
+        <p:spPr/>
+        <p:txBody>
+          <a:bodyPr/>
+          <a:lstStyle/>
+          <a:p>
+            <a:fld id="{AEB3D163-D76A-5F4F-A4CE-5FA8F639A976}" type="slidenum">
+              <a:rPr lang="en-US" smtClean="0"/>
+              <a:t>‹#›</a:t>
+            </a:fld>
+            <a:endParaRPr lang="en-US"/>
           </a:p>
         </p:txBody>
       </p:sp>
     </p:spTree>
     <p:extLst>
       <p:ext uri="{BB962C8B-B14F-4D97-AF65-F5344CB8AC3E}">
-        <p14:creationId xmlns:p14="http://schemas.microsoft.com/office/powerpoint/2010/main" val="1530798138"/>
+        <p14:creationId xmlns:p14="http://schemas.microsoft.com/office/powerpoint/2010/main" val="1793145936"/>
       </p:ext>
     </p:extLst>
   </p:cSld>
@@ -4417,7 +3904,7 @@
 </file>
 
 <file path=ppt/slideLayouts/slideLayout9.xml><?xml version="1.0" encoding="utf-8"?>
-<p:sldLayout xmlns:a="http://schemas.openxmlformats.org/drawingml/2006/main" xmlns:r="http://schemas.openxmlformats.org/officeDocument/2006/relationships" xmlns:p="http://schemas.openxmlformats.org/presentationml/2006/main" showMasterSp="0" preserve="1" userDrawn="1">
+<p:sldLayout xmlns:a="http://schemas.openxmlformats.org/drawingml/2006/main" xmlns:r="http://schemas.openxmlformats.org/officeDocument/2006/relationships" xmlns:p="http://schemas.openxmlformats.org/presentationml/2006/main" showMasterSp="0" userDrawn="1">
   <p:cSld name="1_*Section Break">
     <p:spTree>
       <p:nvGrpSpPr>
@@ -4652,7 +4139,7 @@
     </p:spTree>
     <p:extLst>
       <p:ext uri="{BB962C8B-B14F-4D97-AF65-F5344CB8AC3E}">
-        <p14:creationId xmlns:p14="http://schemas.microsoft.com/office/powerpoint/2010/main" val="2486950759"/>
+        <p14:creationId xmlns:p14="http://schemas.microsoft.com/office/powerpoint/2010/main" val="423656447"/>
       </p:ext>
     </p:extLst>
   </p:cSld>
@@ -4699,48 +4186,6 @@
           <a:chExt cx="0" cy="0"/>
         </a:xfrm>
       </p:grpSpPr>
-      <p:pic>
-        <p:nvPicPr>
-          <p:cNvPr id="14" name="Picture 13">
-            <a:extLst>
-              <a:ext uri="{FF2B5EF4-FFF2-40B4-BE49-F238E27FC236}">
-                <a16:creationId xmlns:a16="http://schemas.microsoft.com/office/drawing/2014/main" id="{ED1C1369-A08C-454A-B0B5-0955BB31B118}"/>
-              </a:ext>
-            </a:extLst>
-          </p:cNvPr>
-          <p:cNvPicPr>
-            <a:picLocks noChangeAspect="1"/>
-          </p:cNvPicPr>
-          <p:nvPr userDrawn="1"/>
-        </p:nvPicPr>
-        <p:blipFill rotWithShape="1">
-          <a:blip r:embed="rId14">
-            <a:extLst>
-              <a:ext uri="{28A0092B-C50C-407E-A947-70E740481C1C}">
-                <a14:useLocalDpi xmlns:a14="http://schemas.microsoft.com/office/drawing/2010/main" val="0"/>
-              </a:ext>
-            </a:extLst>
-          </a:blip>
-          <a:srcRect r="58932" b="1495"/>
-          <a:stretch/>
-        </p:blipFill>
-        <p:spPr>
-          <a:xfrm>
-            <a:off x="9335860" y="0"/>
-            <a:ext cx="2852965" cy="4078297"/>
-          </a:xfrm>
-          <a:prstGeom prst="rect">
-            <a:avLst/>
-          </a:prstGeom>
-          <a:effectLst>
-            <a:outerShdw blurRad="50800" dist="50800" dir="5400000" algn="ctr" rotWithShape="0">
-              <a:srgbClr val="000000">
-                <a:alpha val="0"/>
-              </a:srgbClr>
-            </a:outerShdw>
-          </a:effectLst>
-        </p:spPr>
-      </p:pic>
       <p:sp>
         <p:nvSpPr>
           <p:cNvPr id="1026" name="Title Placeholder 1"/>
@@ -4866,7 +4311,7 @@
           <p:nvPr userDrawn="1"/>
         </p:nvPicPr>
         <p:blipFill>
-          <a:blip r:embed="rId15" cstate="print">
+          <a:blip r:embed="rId11" cstate="print">
             <a:extLst>
               <a:ext uri="{28A0092B-C50C-407E-A947-70E740481C1C}">
                 <a14:useLocalDpi xmlns:a14="http://schemas.microsoft.com/office/drawing/2010/main" val="0"/>
@@ -4879,7 +4324,7 @@
         </p:blipFill>
         <p:spPr>
           <a:xfrm>
-            <a:off x="9741160" y="6183517"/>
+            <a:off x="9741160" y="6185919"/>
             <a:ext cx="1971212" cy="533060"/>
           </a:xfrm>
           <a:prstGeom prst="rect">
@@ -4992,10 +4437,10 @@
       </p:sp>
       <p:pic>
         <p:nvPicPr>
-          <p:cNvPr id="10" name="Picture 9" descr="IDEAS_logo.png">
+          <p:cNvPr id="3" name="Picture 2" descr="A picture containing shape&#10;&#10;Description automatically generated">
             <a:extLst>
               <a:ext uri="{FF2B5EF4-FFF2-40B4-BE49-F238E27FC236}">
-                <a16:creationId xmlns:a16="http://schemas.microsoft.com/office/drawing/2014/main" id="{B8E2FEED-84DC-4438-B439-E3DA7A28736A}"/>
+                <a16:creationId xmlns:a16="http://schemas.microsoft.com/office/drawing/2014/main" id="{2A4943B8-0F89-4A94-B130-A128F45E57C4}"/>
               </a:ext>
             </a:extLst>
           </p:cNvPr>
@@ -5005,10 +4450,10 @@
           <p:nvPr userDrawn="1"/>
         </p:nvPicPr>
         <p:blipFill>
-          <a:blip r:embed="rId16" cstate="print">
+          <a:blip r:embed="rId12">
             <a:extLst>
               <a:ext uri="{28A0092B-C50C-407E-A947-70E740481C1C}">
-                <a14:useLocalDpi xmlns:a14="http://schemas.microsoft.com/office/drawing/2010/main"/>
+                <a14:useLocalDpi xmlns:a14="http://schemas.microsoft.com/office/drawing/2010/main" val="0"/>
               </a:ext>
             </a:extLst>
           </a:blip>
@@ -5018,8 +4463,8 @@
         </p:blipFill>
         <p:spPr>
           <a:xfrm>
-            <a:off x="7663530" y="6156960"/>
-            <a:ext cx="1845330" cy="640080"/>
+            <a:off x="7806050" y="6114121"/>
+            <a:ext cx="1560289" cy="676656"/>
           </a:xfrm>
           <a:prstGeom prst="rect">
             <a:avLst/>
@@ -5036,17 +4481,14 @@
   <p:clrMap bg1="lt1" tx1="dk1" bg2="lt2" tx2="dk2" accent1="accent1" accent2="accent2" accent3="accent3" accent4="accent4" accent5="accent5" accent6="accent6" hlink="hlink" folHlink="folHlink"/>
   <p:sldLayoutIdLst>
     <p:sldLayoutId id="2147483949" r:id="rId1"/>
-    <p:sldLayoutId id="2147483937" r:id="rId2"/>
-    <p:sldLayoutId id="2147483939" r:id="rId3"/>
-    <p:sldLayoutId id="2147483950" r:id="rId4"/>
-    <p:sldLayoutId id="2147483940" r:id="rId5"/>
-    <p:sldLayoutId id="2147483941" r:id="rId6"/>
-    <p:sldLayoutId id="2147483951" r:id="rId7"/>
+    <p:sldLayoutId id="2147483951" r:id="rId2"/>
+    <p:sldLayoutId id="2147483937" r:id="rId3"/>
+    <p:sldLayoutId id="2147483939" r:id="rId4"/>
+    <p:sldLayoutId id="2147483950" r:id="rId5"/>
+    <p:sldLayoutId id="2147483940" r:id="rId6"/>
+    <p:sldLayoutId id="2147483941" r:id="rId7"/>
     <p:sldLayoutId id="2147483952" r:id="rId8"/>
-    <p:sldLayoutId id="2147483958" r:id="rId9"/>
-    <p:sldLayoutId id="2147483956" r:id="rId10"/>
-    <p:sldLayoutId id="2147483957" r:id="rId11"/>
-    <p:sldLayoutId id="2147483959" r:id="rId12"/>
+    <p:sldLayoutId id="2147483953" r:id="rId9"/>
   </p:sldLayoutIdLst>
   <p:hf hdr="0" ftr="0" dt="0"/>
   <p:txStyles>
@@ -5575,129 +5017,6 @@
           </a:p>
         </p:txBody>
       </p:sp>
-      <p:pic>
-        <p:nvPicPr>
-          <p:cNvPr id="6" name="Picture 2" descr="https://licensebuttons.net/l/by/4.0/88x31.png">
-            <a:extLst>
-              <a:ext uri="{FF2B5EF4-FFF2-40B4-BE49-F238E27FC236}">
-                <a16:creationId xmlns:a16="http://schemas.microsoft.com/office/drawing/2014/main" id="{24EAF368-FA38-4254-8E55-6E4D872226E6}"/>
-              </a:ext>
-            </a:extLst>
-          </p:cNvPr>
-          <p:cNvPicPr>
-            <a:picLocks noChangeAspect="1" noChangeArrowheads="1"/>
-          </p:cNvPicPr>
-          <p:nvPr/>
-        </p:nvPicPr>
-        <p:blipFill>
-          <a:blip r:embed="rId2">
-            <a:extLst>
-              <a:ext uri="{28A0092B-C50C-407E-A947-70E740481C1C}">
-                <a14:useLocalDpi xmlns:a14="http://schemas.microsoft.com/office/drawing/2010/main" val="0"/>
-              </a:ext>
-            </a:extLst>
-          </a:blip>
-          <a:srcRect/>
-          <a:stretch>
-            <a:fillRect/>
-          </a:stretch>
-        </p:blipFill>
-        <p:spPr bwMode="auto">
-          <a:xfrm>
-            <a:off x="365760" y="5539716"/>
-            <a:ext cx="1661258" cy="585216"/>
-          </a:xfrm>
-          <a:prstGeom prst="rect">
-            <a:avLst/>
-          </a:prstGeom>
-          <a:noFill/>
-          <a:extLst>
-            <a:ext uri="{909E8E84-426E-40DD-AFC4-6F175D3DCCD1}">
-              <a14:hiddenFill xmlns:a14="http://schemas.microsoft.com/office/drawing/2010/main">
-                <a:solidFill>
-                  <a:srgbClr val="FFFFFF"/>
-                </a:solidFill>
-              </a14:hiddenFill>
-            </a:ext>
-          </a:extLst>
-        </p:spPr>
-      </p:pic>
-      <p:sp>
-        <p:nvSpPr>
-          <p:cNvPr id="7" name="TextBox 6">
-            <a:extLst>
-              <a:ext uri="{FF2B5EF4-FFF2-40B4-BE49-F238E27FC236}">
-                <a16:creationId xmlns:a16="http://schemas.microsoft.com/office/drawing/2014/main" id="{306FBB1C-6D6D-47D4-86AC-DD5BECCBEE38}"/>
-              </a:ext>
-            </a:extLst>
-          </p:cNvPr>
-          <p:cNvSpPr txBox="1"/>
-          <p:nvPr/>
-        </p:nvSpPr>
-        <p:spPr>
-          <a:xfrm>
-            <a:off x="2036432" y="5619958"/>
-            <a:ext cx="1171114" cy="424732"/>
-          </a:xfrm>
-          <a:prstGeom prst="rect">
-            <a:avLst/>
-          </a:prstGeom>
-          <a:noFill/>
-        </p:spPr>
-        <p:txBody>
-          <a:bodyPr wrap="square" rtlCol="0">
-            <a:spAutoFit/>
-          </a:bodyPr>
-          <a:lstStyle/>
-          <a:p>
-            <a:pPr algn="ctr">
-              <a:lnSpc>
-                <a:spcPct val="90000"/>
-              </a:lnSpc>
-            </a:pPr>
-            <a:r>
-              <a:rPr lang="en-US" sz="1200" dirty="0"/>
-              <a:t>See slide 2 for license details</a:t>
-            </a:r>
-          </a:p>
-        </p:txBody>
-      </p:sp>
-      <p:pic>
-        <p:nvPicPr>
-          <p:cNvPr id="3" name="Picture 2">
-            <a:extLst>
-              <a:ext uri="{FF2B5EF4-FFF2-40B4-BE49-F238E27FC236}">
-                <a16:creationId xmlns:a16="http://schemas.microsoft.com/office/drawing/2014/main" id="{07E0F5D5-EB80-46D1-B8E1-4DCB8E956DD4}"/>
-              </a:ext>
-            </a:extLst>
-          </p:cNvPr>
-          <p:cNvPicPr>
-            <a:picLocks noChangeAspect="1"/>
-          </p:cNvPicPr>
-          <p:nvPr/>
-        </p:nvPicPr>
-        <p:blipFill>
-          <a:blip r:embed="rId3" cstate="print">
-            <a:extLst>
-              <a:ext uri="{28A0092B-C50C-407E-A947-70E740481C1C}">
-                <a14:useLocalDpi xmlns:a14="http://schemas.microsoft.com/office/drawing/2010/main" val="0"/>
-              </a:ext>
-            </a:extLst>
-          </a:blip>
-          <a:stretch>
-            <a:fillRect/>
-          </a:stretch>
-        </p:blipFill>
-        <p:spPr>
-          <a:xfrm>
-            <a:off x="271981" y="2924866"/>
-            <a:ext cx="2350008" cy="1008267"/>
-          </a:xfrm>
-          <a:prstGeom prst="rect">
-            <a:avLst/>
-          </a:prstGeom>
-        </p:spPr>
-      </p:pic>
     </p:spTree>
     <p:extLst>
       <p:ext uri="{BB962C8B-B14F-4D97-AF65-F5344CB8AC3E}">
@@ -21787,11 +21106,11 @@
 <file path=customXml/itemProps3.xml><?xml version="1.0" encoding="utf-8"?>
 <ds:datastoreItem xmlns:ds="http://schemas.openxmlformats.org/officeDocument/2006/customXml" ds:itemID="{A50EC660-24D0-43A0-AE5E-E274115E726B}">
   <ds:schemaRefs>
+    <ds:schemaRef ds:uri="http://purl.org/dc/elements/1.1/"/>
+    <ds:schemaRef ds:uri="http://schemas.microsoft.com/office/2006/metadata/properties"/>
     <ds:schemaRef ds:uri="http://purl.org/dc/terms/"/>
     <ds:schemaRef ds:uri="http://schemas.openxmlformats.org/package/2006/metadata/core-properties"/>
     <ds:schemaRef ds:uri="http://schemas.microsoft.com/office/2006/documentManagement/types"/>
-    <ds:schemaRef ds:uri="http://purl.org/dc/elements/1.1/"/>
-    <ds:schemaRef ds:uri="http://schemas.microsoft.com/office/2006/metadata/properties"/>
     <ds:schemaRef ds:uri="http://www.w3.org/XML/1998/namespace"/>
     <ds:schemaRef ds:uri="http://purl.org/dc/dcmitype/"/>
     <ds:schemaRef ds:uri="http://schemas.microsoft.com/office/infopath/2007/PartnerControls"/>

</xml_diff>

<commit_message>
Initial updates for ISS
In all decks, modified as appropriate:
* Presenter
* Presenter affiliation
* Venue
* License slide

Also in overview updated agenda.
</commit_message>
<xml_diff>
--- a/design.pptx
+++ b/design.pptx
@@ -12,7 +12,7 @@
   </p:handoutMasterIdLst>
   <p:sldIdLst>
     <p:sldId id="318" r:id="rId5"/>
-    <p:sldId id="674" r:id="rId6"/>
+    <p:sldId id="320" r:id="rId6"/>
     <p:sldId id="615" r:id="rId7"/>
     <p:sldId id="669" r:id="rId8"/>
     <p:sldId id="670" r:id="rId9"/>
@@ -282,7 +282,7 @@
           <a:p>
             <a:fld id="{0B842F42-2CE9-4E35-95C1-410DC08A50B1}" type="datetimeFigureOut">
               <a:rPr lang="en-US" smtClean="0"/>
-              <a:t>9/1/2021</a:t>
+              <a:t>3/25/2022</a:t>
             </a:fld>
             <a:endParaRPr lang="en-US"/>
           </a:p>
@@ -447,7 +447,7 @@
           <a:p>
             <a:fld id="{6F282904-F315-4730-8D91-37D99E141A6F}" type="datetimeFigureOut">
               <a:rPr lang="en-US" smtClean="0"/>
-              <a:t>9/1/2021</a:t>
+              <a:t>3/25/2022</a:t>
             </a:fld>
             <a:endParaRPr lang="en-US"/>
           </a:p>
@@ -3938,7 +3938,7 @@
           <a:p>
             <a:fld id="{68F49DD1-DDB5-AB43-B311-7649AD474C82}" type="datetimeFigureOut">
               <a:rPr lang="en-US" smtClean="0"/>
-              <a:t>9/1/2021</a:t>
+              <a:t>3/25/2022</a:t>
             </a:fld>
             <a:endParaRPr lang="en-US"/>
           </a:p>
@@ -4862,15 +4862,7 @@
             </a:pPr>
             <a:r>
               <a:rPr lang="en-US" sz="2000" dirty="0"/>
-              <a:t>Better Scientific </a:t>
-            </a:r>
-            <a:r>
-              <a:rPr lang="en-US" sz="2000"/>
-              <a:t>Software tutorial </a:t>
-            </a:r>
-            <a:r>
-              <a:rPr lang="en-US" sz="2000" dirty="0"/>
-              <a:t>@ SC21</a:t>
+              <a:t>Better Scientific Software tutorial @ Improving Scientific Software 2022</a:t>
             </a:r>
           </a:p>
           <a:p>
@@ -14577,15 +14569,21 @@
             </a:pPr>
             <a:r>
               <a:rPr lang="en-US" sz="1600" b="1" dirty="0"/>
-              <a:t>The requested citation the overall tutorial is: David E. Bernholdt, Anshu Dubey, Patricia A. Grubel, Rinku K. Gupta, and Gregory R. Watson, Better Scientific Software tutorial, in the International Conference for High-Performance Computing, Networking, Storage, and Analysis (SC21), St. Louis, MO, USA and online, 2021. DOI: </a:t>
+              <a:t>The requested citation the overall tutorial is: David E. Bernholdt, Patricia A. Grubel, Rinku K. Gupta, and David M. Rogers, Better Scientific Software tutorial, in Improving Scientific Software conference, online, 2022. DOI: </a:t>
             </a:r>
             <a:r>
               <a:rPr lang="en-US" sz="1600" b="1" dirty="0">
                 <a:hlinkClick r:id="rId4"/>
               </a:rPr>
-              <a:t>10.6084/m9.figshare.16556628</a:t>
-            </a:r>
-            <a:endParaRPr lang="en-US" sz="1600" b="1" dirty="0"/>
+              <a:t>10.6084/m9.figshare</a:t>
+            </a:r>
+            <a:r>
+              <a:rPr lang="en-US" sz="1600" b="1">
+                <a:hlinkClick r:id="rId4"/>
+              </a:rPr>
+              <a:t>.19416767</a:t>
+            </a:r>
+            <a:endParaRPr lang="en-US" sz="1600" b="1"/>
           </a:p>
           <a:p>
             <a:pPr>
@@ -14757,7 +14755,7 @@
     </p:spTree>
     <p:extLst>
       <p:ext uri="{BB962C8B-B14F-4D97-AF65-F5344CB8AC3E}">
-        <p14:creationId xmlns:p14="http://schemas.microsoft.com/office/powerpoint/2010/main" val="4227040908"/>
+        <p14:creationId xmlns:p14="http://schemas.microsoft.com/office/powerpoint/2010/main" val="978726433"/>
       </p:ext>
     </p:extLst>
   </p:cSld>
@@ -27593,6 +27591,21 @@
 </file>
 
 <file path=customXml/item1.xml><?xml version="1.0" encoding="utf-8"?>
+<p:properties xmlns:p="http://schemas.microsoft.com/office/2006/metadata/properties" xmlns:xsi="http://www.w3.org/2001/XMLSchema-instance" xmlns:pc="http://schemas.microsoft.com/office/infopath/2007/PartnerControls">
+  <documentManagement/>
+</p:properties>
+</file>
+
+<file path=customXml/item2.xml><?xml version="1.0" encoding="utf-8"?>
+<?mso-contentType ?>
+<FormTemplates xmlns="http://schemas.microsoft.com/sharepoint/v3/contenttype/forms">
+  <Display>DocumentLibraryForm</Display>
+  <Edit>DocumentLibraryForm</Edit>
+  <New>DocumentLibraryForm</New>
+</FormTemplates>
+</file>
+
+<file path=customXml/item3.xml><?xml version="1.0" encoding="utf-8"?>
 <ct:contentTypeSchema xmlns:ct="http://schemas.microsoft.com/office/2006/metadata/contentType" xmlns:ma="http://schemas.microsoft.com/office/2006/metadata/properties/metaAttributes" ct:_="" ma:_="" ma:contentTypeName="Document" ma:contentTypeID="0x010100565464437F680748A68B85EB6594EA7D" ma:contentTypeVersion="0" ma:contentTypeDescription="Create a new document." ma:contentTypeScope="" ma:versionID="fe3f4dd58d5914c51cfc6deaa8ad845c">
   <xsd:schema xmlns:xsd="http://www.w3.org/2001/XMLSchema" xmlns:p="http://schemas.microsoft.com/office/2006/metadata/properties" targetNamespace="http://schemas.microsoft.com/office/2006/metadata/properties" ma:root="true" ma:fieldsID="4aeb20c0e3442673af7ee10786458764">
     <xsd:element name="properties">
@@ -27641,32 +27654,17 @@
 </ct:contentTypeSchema>
 </file>
 
-<file path=customXml/item2.xml><?xml version="1.0" encoding="utf-8"?>
-<?mso-contentType ?>
-<FormTemplates xmlns="http://schemas.microsoft.com/sharepoint/v3/contenttype/forms">
-  <Display>DocumentLibraryForm</Display>
-  <Edit>DocumentLibraryForm</Edit>
-  <New>DocumentLibraryForm</New>
-</FormTemplates>
-</file>
-
-<file path=customXml/item3.xml><?xml version="1.0" encoding="utf-8"?>
-<p:properties xmlns:p="http://schemas.microsoft.com/office/2006/metadata/properties" xmlns:xsi="http://www.w3.org/2001/XMLSchema-instance" xmlns:pc="http://schemas.microsoft.com/office/infopath/2007/PartnerControls">
-  <documentManagement/>
-</p:properties>
-</file>
-
 <file path=customXml/itemProps1.xml><?xml version="1.0" encoding="utf-8"?>
-<ds:datastoreItem xmlns:ds="http://schemas.openxmlformats.org/officeDocument/2006/customXml" ds:itemID="{E8DB7DEB-074E-4EE8-9B6E-FD277323109C}">
+<ds:datastoreItem xmlns:ds="http://schemas.openxmlformats.org/officeDocument/2006/customXml" ds:itemID="{A50EC660-24D0-43A0-AE5E-E274115E726B}">
   <ds:schemaRefs>
-    <ds:schemaRef ds:uri="http://schemas.microsoft.com/office/2006/metadata/contentType"/>
-    <ds:schemaRef ds:uri="http://schemas.microsoft.com/office/2006/metadata/properties/metaAttributes"/>
-    <ds:schemaRef ds:uri="http://www.w3.org/2001/XMLSchema"/>
+    <ds:schemaRef ds:uri="http://purl.org/dc/elements/1.1/"/>
     <ds:schemaRef ds:uri="http://schemas.microsoft.com/office/2006/metadata/properties"/>
+    <ds:schemaRef ds:uri="http://purl.org/dc/terms/"/>
     <ds:schemaRef ds:uri="http://schemas.openxmlformats.org/package/2006/metadata/core-properties"/>
-    <ds:schemaRef ds:uri="http://purl.org/dc/elements/1.1/"/>
-    <ds:schemaRef ds:uri="http://purl.org/dc/terms/"/>
-    <ds:schemaRef ds:uri="http://schemas.microsoft.com/office/internal/2005/internalDocumentation"/>
+    <ds:schemaRef ds:uri="http://schemas.microsoft.com/office/2006/documentManagement/types"/>
+    <ds:schemaRef ds:uri="http://www.w3.org/XML/1998/namespace"/>
+    <ds:schemaRef ds:uri="http://purl.org/dc/dcmitype/"/>
+    <ds:schemaRef ds:uri="http://schemas.microsoft.com/office/infopath/2007/PartnerControls"/>
   </ds:schemaRefs>
 </ds:datastoreItem>
 </file>
@@ -27680,16 +27678,16 @@
 </file>
 
 <file path=customXml/itemProps3.xml><?xml version="1.0" encoding="utf-8"?>
-<ds:datastoreItem xmlns:ds="http://schemas.openxmlformats.org/officeDocument/2006/customXml" ds:itemID="{A50EC660-24D0-43A0-AE5E-E274115E726B}">
+<ds:datastoreItem xmlns:ds="http://schemas.openxmlformats.org/officeDocument/2006/customXml" ds:itemID="{E8DB7DEB-074E-4EE8-9B6E-FD277323109C}">
   <ds:schemaRefs>
+    <ds:schemaRef ds:uri="http://schemas.microsoft.com/office/2006/metadata/contentType"/>
+    <ds:schemaRef ds:uri="http://schemas.microsoft.com/office/2006/metadata/properties/metaAttributes"/>
+    <ds:schemaRef ds:uri="http://www.w3.org/2001/XMLSchema"/>
+    <ds:schemaRef ds:uri="http://schemas.microsoft.com/office/2006/metadata/properties"/>
+    <ds:schemaRef ds:uri="http://schemas.openxmlformats.org/package/2006/metadata/core-properties"/>
     <ds:schemaRef ds:uri="http://purl.org/dc/elements/1.1/"/>
-    <ds:schemaRef ds:uri="http://schemas.microsoft.com/office/2006/metadata/properties"/>
     <ds:schemaRef ds:uri="http://purl.org/dc/terms/"/>
-    <ds:schemaRef ds:uri="http://schemas.openxmlformats.org/package/2006/metadata/core-properties"/>
-    <ds:schemaRef ds:uri="http://schemas.microsoft.com/office/2006/documentManagement/types"/>
-    <ds:schemaRef ds:uri="http://www.w3.org/XML/1998/namespace"/>
-    <ds:schemaRef ds:uri="http://purl.org/dc/dcmitype/"/>
-    <ds:schemaRef ds:uri="http://schemas.microsoft.com/office/infopath/2007/PartnerControls"/>
+    <ds:schemaRef ds:uri="http://schemas.microsoft.com/office/internal/2005/internalDocumentation"/>
   </ds:schemaRefs>
 </ds:datastoreItem>
 </file>
</xml_diff>

<commit_message>
Everything updated for ISS
</commit_message>
<xml_diff>
--- a/design.pptx
+++ b/design.pptx
@@ -12,7 +12,7 @@
   </p:handoutMasterIdLst>
   <p:sldIdLst>
     <p:sldId id="318" r:id="rId5"/>
-    <p:sldId id="674" r:id="rId6"/>
+    <p:sldId id="320" r:id="rId6"/>
     <p:sldId id="615" r:id="rId7"/>
     <p:sldId id="669" r:id="rId8"/>
     <p:sldId id="670" r:id="rId9"/>
@@ -282,7 +282,7 @@
           <a:p>
             <a:fld id="{0B842F42-2CE9-4E35-95C1-410DC08A50B1}" type="datetimeFigureOut">
               <a:rPr lang="en-US" smtClean="0"/>
-              <a:t>10/28/2022</a:t>
+              <a:t>4/15/2023</a:t>
             </a:fld>
             <a:endParaRPr lang="en-US"/>
           </a:p>
@@ -447,7 +447,7 @@
           <a:p>
             <a:fld id="{6F282904-F315-4730-8D91-37D99E141A6F}" type="datetimeFigureOut">
               <a:rPr lang="en-US" smtClean="0"/>
-              <a:t>10/28/2022</a:t>
+              <a:t>4/15/2023</a:t>
             </a:fld>
             <a:endParaRPr lang="en-US"/>
           </a:p>
@@ -3938,7 +3938,7 @@
           <a:p>
             <a:fld id="{68F49DD1-DDB5-AB43-B311-7649AD474C82}" type="datetimeFigureOut">
               <a:rPr lang="en-US" smtClean="0"/>
-              <a:t>10/28/2022</a:t>
+              <a:t>4/15/2023</a:t>
             </a:fld>
             <a:endParaRPr lang="en-US"/>
           </a:p>
@@ -4834,25 +4834,25 @@
           <a:lstStyle/>
           <a:p>
             <a:r>
-              <a:rPr lang="en-US" u="sng" dirty="0" err="1"/>
-              <a:t>Anshu</a:t>
-            </a:r>
-            <a:r>
               <a:rPr lang="en-US" u="sng" dirty="0"/>
-              <a:t> Dubey </a:t>
+              <a:t>David E. Bernholdt</a:t>
+            </a:r>
+            <a:r>
+              <a:rPr lang="en-US" dirty="0"/>
+              <a:t> </a:t>
             </a:r>
             <a:r>
               <a:rPr lang="en-US" sz="2000" dirty="0"/>
-              <a:t>(she/her)</a:t>
+              <a:t>(he/him)</a:t>
             </a:r>
             <a:br>
+              <a:rPr lang="en-US" sz="2000" u="sng" dirty="0"/>
+            </a:br>
+            <a:r>
               <a:rPr lang="en-US" sz="2000" dirty="0"/>
-            </a:br>
-            <a:r>
-              <a:rPr lang="en-US" sz="2000" dirty="0"/>
-              <a:t>Argonne National Laboratory</a:t>
-            </a:r>
-            <a:endParaRPr lang="en-US" dirty="0"/>
+              <a:t>Oak Ridge National Laboratory</a:t>
+            </a:r>
+            <a:endParaRPr lang="en-US" sz="2400" dirty="0"/>
           </a:p>
           <a:p>
             <a:pPr>
@@ -4862,7 +4862,14 @@
             </a:pPr>
             <a:r>
               <a:rPr lang="en-US" sz="2000" dirty="0"/>
-              <a:t>Better Scientific Software tutorial @ SC22</a:t>
+              <a:t>Better Scientific Software tutorial </a:t>
+            </a:r>
+            <a:br>
+              <a:rPr lang="en-US" sz="2000" dirty="0"/>
+            </a:br>
+            <a:r>
+              <a:rPr lang="en-US" sz="2000" dirty="0"/>
+              <a:t>@ Improving Scientific Software conference (2023)</a:t>
             </a:r>
           </a:p>
           <a:p>
@@ -4873,23 +4880,7 @@
             </a:pPr>
             <a:r>
               <a:rPr lang="en-US" sz="2000" dirty="0"/>
-              <a:t>Contributors: </a:t>
-            </a:r>
-            <a:r>
-              <a:rPr lang="en-US" sz="2000" dirty="0" err="1"/>
-              <a:t>Anshu</a:t>
-            </a:r>
-            <a:r>
-              <a:rPr lang="en-US" sz="2000" dirty="0"/>
-              <a:t> Dubey (ANL), Mark C. Miller (LLNL), David </a:t>
-            </a:r>
-            <a:r>
-              <a:rPr lang="en-US" sz="2000" dirty="0" err="1"/>
-              <a:t>Bernholdt</a:t>
-            </a:r>
-            <a:r>
-              <a:rPr lang="en-US" sz="2000" dirty="0"/>
-              <a:t> (ORNL)</a:t>
+              <a:t>Contributors: Anshu Dubey (ANL), Mark C. Miller (LLNL), David E. Bernholdt (ORNL)</a:t>
             </a:r>
           </a:p>
         </p:txBody>
@@ -14585,16 +14576,37 @@
             </a:pPr>
             <a:r>
               <a:rPr lang="en-US" sz="1600" b="1" dirty="0"/>
-              <a:t>The requested citation the overall tutorial is: David E. Bernholdt, Anshu Dubey, and Patricia A. Grubel, Better Scientific Software tutorial, in The International Conference for High-Performance Computing, Networking, Storage, and Analysis (SC22), Dallas, Texas, 2022. DOI: </a:t>
-            </a:r>
-            <a:r>
-              <a:rPr lang="en-US" sz="1600" b="1" dirty="0">
+              <a:t>The requested citation the overall tutorial is: </a:t>
+            </a:r>
+            <a:r>
+              <a:rPr lang="en-US" sz="1600" b="0" i="0" dirty="0">
+                <a:solidFill>
+                  <a:srgbClr val="111111"/>
+                </a:solidFill>
+                <a:effectLst/>
+                <a:latin typeface="+mn-lt"/>
+              </a:rPr>
+              <a:t>David E. Bernholdt, Patricia A. Grubel, and David M. Rogers, Better Scientific Software tutorial, in Improving Scientific Software, Boulder, Colorado and online, 2023. DOI: </a:t>
+            </a:r>
+            <a:r>
+              <a:rPr lang="en-US" sz="1600" b="0" i="0" dirty="0">
+                <a:solidFill>
+                  <a:srgbClr val="111111"/>
+                </a:solidFill>
+                <a:effectLst/>
+                <a:latin typeface="+mn-lt"/>
                 <a:hlinkClick r:id="rId4"/>
               </a:rPr>
-              <a:t>10.6084/m9.figshare.21384057</a:t>
-            </a:r>
-            <a:r>
-              <a:rPr lang="en-US" sz="1600" b="1" dirty="0"/>
+              <a:t>10.6084/m9.figshare.22179748</a:t>
+            </a:r>
+            <a:r>
+              <a:rPr lang="en-US" sz="1600" b="0" i="0" dirty="0">
+                <a:solidFill>
+                  <a:srgbClr val="111111"/>
+                </a:solidFill>
+                <a:effectLst/>
+                <a:latin typeface="+mn-lt"/>
+              </a:rPr>
               <a:t>.</a:t>
             </a:r>
           </a:p>
@@ -14614,7 +14626,21 @@
             </a:r>
             <a:r>
               <a:rPr lang="en-US" sz="1600" dirty="0"/>
-              <a:t>, in Better Scientific Software tutorial, …</a:t>
+              <a:t>, in </a:t>
+            </a:r>
+            <a:r>
+              <a:rPr lang="en-US" sz="1600" b="0" i="1" dirty="0">
+                <a:solidFill>
+                  <a:srgbClr val="111111"/>
+                </a:solidFill>
+                <a:effectLst/>
+                <a:latin typeface="+mn-lt"/>
+              </a:rPr>
+              <a:t>Tutorial Title</a:t>
+            </a:r>
+            <a:r>
+              <a:rPr lang="en-US" sz="1600" dirty="0"/>
+              <a:t>, …</a:t>
             </a:r>
           </a:p>
           <a:p>
@@ -14697,13 +14723,8 @@
             </a:pPr>
             <a:r>
               <a:rPr lang="en-US" sz="1400" dirty="0"/>
-              <a:t>This work was performed in part at Sandia National Laboratories. Sandia National Laboratories is a multi-mission laboratory managed and operated by National Technology and Engineering Solutions of Sandia, LLC., a wholly owned subsidiary of Honeywell International, Inc., for the U.S. Department of Energy’s National Nuclear Security Administration under contract </a:t>
-            </a:r>
-            <a:r>
-              <a:rPr lang="en-US" sz="1400"/>
-              <a:t>DE-NA0003525.</a:t>
-            </a:r>
-            <a:endParaRPr lang="en-US" sz="1400" dirty="0"/>
+              <a:t>This work was performed in part at Sandia National Laboratories. Sandia National Laboratories is a multi-mission laboratory managed and operated by National Technology and Engineering Solutions of Sandia, LLC., a wholly owned subsidiary of Honeywell International, Inc., for the U.S. Department of Energy’s National Nuclear Security Administration under contract DE-NA0003525.</a:t>
+            </a:r>
           </a:p>
         </p:txBody>
       </p:sp>
@@ -14757,7 +14778,7 @@
     </p:spTree>
     <p:extLst>
       <p:ext uri="{BB962C8B-B14F-4D97-AF65-F5344CB8AC3E}">
-        <p14:creationId xmlns:p14="http://schemas.microsoft.com/office/powerpoint/2010/main" val="978726433"/>
+        <p14:creationId xmlns:p14="http://schemas.microsoft.com/office/powerpoint/2010/main" val="3692252515"/>
       </p:ext>
     </p:extLst>
   </p:cSld>
@@ -26018,7 +26039,7 @@
             <a:pPr algn="ctr"/>
             <a:r>
               <a:rPr lang="en-US" dirty="0"/>
-              <a:t>Applies to  both kind</a:t>
+              <a:t>Applies to  both kinds</a:t>
             </a:r>
           </a:p>
         </p:txBody>
@@ -28495,6 +28516,15 @@
 </file>
 
 <file path=customXml/item1.xml><?xml version="1.0" encoding="utf-8"?>
+<?mso-contentType ?>
+<FormTemplates xmlns="http://schemas.microsoft.com/sharepoint/v3/contenttype/forms">
+  <Display>DocumentLibraryForm</Display>
+  <Edit>DocumentLibraryForm</Edit>
+  <New>DocumentLibraryForm</New>
+</FormTemplates>
+</file>
+
+<file path=customXml/item2.xml><?xml version="1.0" encoding="utf-8"?>
 <ct:contentTypeSchema xmlns:ct="http://schemas.microsoft.com/office/2006/metadata/contentType" xmlns:ma="http://schemas.microsoft.com/office/2006/metadata/properties/metaAttributes" ct:_="" ma:_="" ma:contentTypeName="Document" ma:contentTypeID="0x010100565464437F680748A68B85EB6594EA7D" ma:contentTypeVersion="0" ma:contentTypeDescription="Create a new document." ma:contentTypeScope="" ma:versionID="fe3f4dd58d5914c51cfc6deaa8ad845c">
   <xsd:schema xmlns:xsd="http://www.w3.org/2001/XMLSchema" xmlns:p="http://schemas.microsoft.com/office/2006/metadata/properties" targetNamespace="http://schemas.microsoft.com/office/2006/metadata/properties" ma:root="true" ma:fieldsID="4aeb20c0e3442673af7ee10786458764">
     <xsd:element name="properties">
@@ -28543,22 +28573,21 @@
 </ct:contentTypeSchema>
 </file>
 
-<file path=customXml/item2.xml><?xml version="1.0" encoding="utf-8"?>
+<file path=customXml/item3.xml><?xml version="1.0" encoding="utf-8"?>
 <p:properties xmlns:p="http://schemas.microsoft.com/office/2006/metadata/properties" xmlns:xsi="http://www.w3.org/2001/XMLSchema-instance" xmlns:pc="http://schemas.microsoft.com/office/infopath/2007/PartnerControls">
   <documentManagement/>
 </p:properties>
 </file>
 
-<file path=customXml/item3.xml><?xml version="1.0" encoding="utf-8"?>
-<?mso-contentType ?>
-<FormTemplates xmlns="http://schemas.microsoft.com/sharepoint/v3/contenttype/forms">
-  <Display>DocumentLibraryForm</Display>
-  <Edit>DocumentLibraryForm</Edit>
-  <New>DocumentLibraryForm</New>
-</FormTemplates>
+<file path=customXml/itemProps1.xml><?xml version="1.0" encoding="utf-8"?>
+<ds:datastoreItem xmlns:ds="http://schemas.openxmlformats.org/officeDocument/2006/customXml" ds:itemID="{19E20559-B232-4371-8690-E3D8007EDB82}">
+  <ds:schemaRefs>
+    <ds:schemaRef ds:uri="http://schemas.microsoft.com/sharepoint/v3/contenttype/forms"/>
+  </ds:schemaRefs>
+</ds:datastoreItem>
 </file>
 
-<file path=customXml/itemProps1.xml><?xml version="1.0" encoding="utf-8"?>
+<file path=customXml/itemProps2.xml><?xml version="1.0" encoding="utf-8"?>
 <ds:datastoreItem xmlns:ds="http://schemas.openxmlformats.org/officeDocument/2006/customXml" ds:itemID="{E8DB7DEB-074E-4EE8-9B6E-FD277323109C}">
   <ds:schemaRefs>
     <ds:schemaRef ds:uri="http://schemas.microsoft.com/office/2006/metadata/contentType"/>
@@ -28573,7 +28602,7 @@
 </ds:datastoreItem>
 </file>
 
-<file path=customXml/itemProps2.xml><?xml version="1.0" encoding="utf-8"?>
+<file path=customXml/itemProps3.xml><?xml version="1.0" encoding="utf-8"?>
 <ds:datastoreItem xmlns:ds="http://schemas.openxmlformats.org/officeDocument/2006/customXml" ds:itemID="{A50EC660-24D0-43A0-AE5E-E274115E726B}">
   <ds:schemaRefs>
     <ds:schemaRef ds:uri="http://purl.org/dc/elements/1.1/"/>
@@ -28586,12 +28615,4 @@
     <ds:schemaRef ds:uri="http://schemas.microsoft.com/office/infopath/2007/PartnerControls"/>
   </ds:schemaRefs>
 </ds:datastoreItem>
-</file>
-
-<file path=customXml/itemProps3.xml><?xml version="1.0" encoding="utf-8"?>
-<ds:datastoreItem xmlns:ds="http://schemas.openxmlformats.org/officeDocument/2006/customXml" ds:itemID="{19E20559-B232-4371-8690-E3D8007EDB82}">
-  <ds:schemaRefs>
-    <ds:schemaRef ds:uri="http://schemas.microsoft.com/sharepoint/v3/contenttype/forms"/>
-  </ds:schemaRefs>
-</ds:datastoreItem>
 </file>
</xml_diff>

<commit_message>
modified all my modules for ATPESC
</commit_message>
<xml_diff>
--- a/design.pptx
+++ b/design.pptx
@@ -5496,7 +5496,7 @@
           <a:p>
             <a:r>
               <a:rPr lang="en-US" dirty="0"/>
-              <a:t>Better Scientific Software tutorial @</a:t>
+              <a:t>Software Productivity and Sustainability Track @ ATPESC</a:t>
             </a:r>
           </a:p>
         </p:txBody>
@@ -7145,7 +7145,7 @@
           <a:noFill/>
           <a:extLst>
             <a:ext uri="{909E8E84-426E-40dd-AFC4-6F175D3DCCD1}">
-              <a14:hiddenFill xmlns="" xmlns:a14="http://schemas.microsoft.com/office/drawing/2010/main">
+              <a14:hiddenFill xmlns:a14="http://schemas.microsoft.com/office/drawing/2010/main" xmlns="">
                 <a:solidFill>
                   <a:srgbClr val="FFFFFF"/>
                 </a:solidFill>
@@ -29884,15 +29884,6 @@
 </file>
 
 <file path=customXml/item2.xml><?xml version="1.0" encoding="utf-8"?>
-<?mso-contentType ?>
-<FormTemplates xmlns="http://schemas.microsoft.com/sharepoint/v3/contenttype/forms">
-  <Display>DocumentLibraryForm</Display>
-  <Edit>DocumentLibraryForm</Edit>
-  <New>DocumentLibraryForm</New>
-</FormTemplates>
-</file>
-
-<file path=customXml/item3.xml><?xml version="1.0" encoding="utf-8"?>
 <ct:contentTypeSchema xmlns:ct="http://schemas.microsoft.com/office/2006/metadata/contentType" xmlns:ma="http://schemas.microsoft.com/office/2006/metadata/properties/metaAttributes" ct:_="" ma:_="" ma:contentTypeName="Document" ma:contentTypeID="0x010100565464437F680748A68B85EB6594EA7D" ma:contentTypeVersion="0" ma:contentTypeDescription="Create a new document." ma:contentTypeScope="" ma:versionID="fe3f4dd58d5914c51cfc6deaa8ad845c">
   <xsd:schema xmlns:xsd="http://www.w3.org/2001/XMLSchema" xmlns:p="http://schemas.microsoft.com/office/2006/metadata/properties" targetNamespace="http://schemas.microsoft.com/office/2006/metadata/properties" ma:root="true" ma:fieldsID="4aeb20c0e3442673af7ee10786458764">
     <xsd:element name="properties">
@@ -29941,6 +29932,15 @@
 </ct:contentTypeSchema>
 </file>
 
+<file path=customXml/item3.xml><?xml version="1.0" encoding="utf-8"?>
+<?mso-contentType ?>
+<FormTemplates xmlns="http://schemas.microsoft.com/sharepoint/v3/contenttype/forms">
+  <Display>DocumentLibraryForm</Display>
+  <Edit>DocumentLibraryForm</Edit>
+  <New>DocumentLibraryForm</New>
+</FormTemplates>
+</file>
+
 <file path=customXml/itemProps1.xml><?xml version="1.0" encoding="utf-8"?>
 <ds:datastoreItem xmlns:ds="http://schemas.openxmlformats.org/officeDocument/2006/customXml" ds:itemID="{A50EC660-24D0-43A0-AE5E-E274115E726B}">
   <ds:schemaRefs>
@@ -29957,14 +29957,6 @@
 </file>
 
 <file path=customXml/itemProps2.xml><?xml version="1.0" encoding="utf-8"?>
-<ds:datastoreItem xmlns:ds="http://schemas.openxmlformats.org/officeDocument/2006/customXml" ds:itemID="{19E20559-B232-4371-8690-E3D8007EDB82}">
-  <ds:schemaRefs>
-    <ds:schemaRef ds:uri="http://schemas.microsoft.com/sharepoint/v3/contenttype/forms"/>
-  </ds:schemaRefs>
-</ds:datastoreItem>
-</file>
-
-<file path=customXml/itemProps3.xml><?xml version="1.0" encoding="utf-8"?>
 <ds:datastoreItem xmlns:ds="http://schemas.openxmlformats.org/officeDocument/2006/customXml" ds:itemID="{E8DB7DEB-074E-4EE8-9B6E-FD277323109C}">
   <ds:schemaRefs>
     <ds:schemaRef ds:uri="http://schemas.microsoft.com/office/2006/metadata/contentType"/>
@@ -29977,4 +29969,12 @@
     <ds:schemaRef ds:uri="http://schemas.microsoft.com/office/internal/2005/internalDocumentation"/>
   </ds:schemaRefs>
 </ds:datastoreItem>
+</file>
+
+<file path=customXml/itemProps3.xml><?xml version="1.0" encoding="utf-8"?>
+<ds:datastoreItem xmlns:ds="http://schemas.openxmlformats.org/officeDocument/2006/customXml" ds:itemID="{19E20559-B232-4371-8690-E3D8007EDB82}">
+  <ds:schemaRefs>
+    <ds:schemaRef ds:uri="http://schemas.microsoft.com/sharepoint/v3/contenttype/forms"/>
+  </ds:schemaRefs>
+</ds:datastoreItem>
 </file>
</xml_diff>